<commit_message>
small last minute fixes
</commit_message>
<xml_diff>
--- a/slides/01-WhatIsAComputer.pptx
+++ b/slides/01-WhatIsAComputer.pptx
@@ -234,7 +234,7 @@
           <a:p>
             <a:fld id="{C5B45307-6ED4-B142-BD64-10F739779302}" type="datetimeFigureOut">
               <a:rPr lang="en-US" smtClean="0"/>
-              <a:t>8/9/23</a:t>
+              <a:t>8/22/23</a:t>
             </a:fld>
             <a:endParaRPr lang="en-US"/>
           </a:p>
@@ -1197,7 +1197,7 @@
           <a:noFill/>
           <a:extLst>
             <a:ext uri="{909E8E84-426E-40dd-AFC4-6F175D3DCCD1}">
-              <a14:hiddenFill xmlns="" xmlns:a14="http://schemas.microsoft.com/office/drawing/2010/main">
+              <a14:hiddenFill xmlns:a14="http://schemas.microsoft.com/office/drawing/2010/main" xmlns="">
                 <a:solidFill>
                   <a:srgbClr val="FFFFFF"/>
                 </a:solidFill>
@@ -1256,7 +1256,7 @@
             </a:ln>
             <a:extLst>
               <a:ext uri="{91240B29-F687-4f45-9708-019B960494DF}">
-                <a14:hiddenLine xmlns="" xmlns:a14="http://schemas.microsoft.com/office/drawing/2010/main" w="9525">
+                <a14:hiddenLine xmlns:a14="http://schemas.microsoft.com/office/drawing/2010/main" xmlns="" w="9525">
                   <a:solidFill>
                     <a:srgbClr val="000000"/>
                   </a:solidFill>
@@ -1346,7 +1346,7 @@
             </a:ln>
             <a:extLst>
               <a:ext uri="{91240B29-F687-4f45-9708-019B960494DF}">
-                <a14:hiddenLine xmlns="" xmlns:a14="http://schemas.microsoft.com/office/drawing/2010/main" w="9525">
+                <a14:hiddenLine xmlns:a14="http://schemas.microsoft.com/office/drawing/2010/main" xmlns="" w="9525">
                   <a:solidFill>
                     <a:srgbClr val="000000"/>
                   </a:solidFill>
@@ -1436,7 +1436,7 @@
             </a:ln>
             <a:extLst>
               <a:ext uri="{91240B29-F687-4f45-9708-019B960494DF}">
-                <a14:hiddenLine xmlns="" xmlns:a14="http://schemas.microsoft.com/office/drawing/2010/main" w="9525">
+                <a14:hiddenLine xmlns:a14="http://schemas.microsoft.com/office/drawing/2010/main" xmlns="" w="9525">
                   <a:solidFill>
                     <a:srgbClr val="000000"/>
                   </a:solidFill>
@@ -1470,7 +1470,7 @@
             </a:ln>
             <a:extLst>
               <a:ext uri="{91240B29-F687-4f45-9708-019B960494DF}">
-                <a14:hiddenLine xmlns="" xmlns:a14="http://schemas.microsoft.com/office/drawing/2010/main" w="9525">
+                <a14:hiddenLine xmlns:a14="http://schemas.microsoft.com/office/drawing/2010/main" xmlns="" w="9525">
                   <a:solidFill>
                     <a:srgbClr val="000000"/>
                   </a:solidFill>
@@ -1560,7 +1560,7 @@
             </a:ln>
             <a:extLst>
               <a:ext uri="{91240B29-F687-4f45-9708-019B960494DF}">
-                <a14:hiddenLine xmlns="" xmlns:a14="http://schemas.microsoft.com/office/drawing/2010/main" w="9525">
+                <a14:hiddenLine xmlns:a14="http://schemas.microsoft.com/office/drawing/2010/main" xmlns="" w="9525">
                   <a:solidFill>
                     <a:srgbClr val="000000"/>
                   </a:solidFill>
@@ -1622,7 +1622,7 @@
             </a:ln>
             <a:extLst>
               <a:ext uri="{91240B29-F687-4f45-9708-019B960494DF}">
-                <a14:hiddenLine xmlns="" xmlns:a14="http://schemas.microsoft.com/office/drawing/2010/main" w="9525">
+                <a14:hiddenLine xmlns:a14="http://schemas.microsoft.com/office/drawing/2010/main" xmlns="" w="9525">
                   <a:solidFill>
                     <a:srgbClr val="000000"/>
                   </a:solidFill>
@@ -1684,7 +1684,7 @@
             </a:ln>
             <a:extLst>
               <a:ext uri="{91240B29-F687-4f45-9708-019B960494DF}">
-                <a14:hiddenLine xmlns="" xmlns:a14="http://schemas.microsoft.com/office/drawing/2010/main" w="9525">
+                <a14:hiddenLine xmlns:a14="http://schemas.microsoft.com/office/drawing/2010/main" xmlns="" w="9525">
                   <a:solidFill>
                     <a:srgbClr val="000000"/>
                   </a:solidFill>
@@ -1774,7 +1774,7 @@
             </a:ln>
             <a:extLst>
               <a:ext uri="{91240B29-F687-4f45-9708-019B960494DF}">
-                <a14:hiddenLine xmlns="" xmlns:a14="http://schemas.microsoft.com/office/drawing/2010/main" w="9525">
+                <a14:hiddenLine xmlns:a14="http://schemas.microsoft.com/office/drawing/2010/main" xmlns="" w="9525">
                   <a:solidFill>
                     <a:srgbClr val="000000"/>
                   </a:solidFill>
@@ -1836,7 +1836,7 @@
             </a:ln>
             <a:extLst>
               <a:ext uri="{91240B29-F687-4f45-9708-019B960494DF}">
-                <a14:hiddenLine xmlns="" xmlns:a14="http://schemas.microsoft.com/office/drawing/2010/main" w="9525">
+                <a14:hiddenLine xmlns:a14="http://schemas.microsoft.com/office/drawing/2010/main" xmlns="" w="9525">
                   <a:solidFill>
                     <a:srgbClr val="000000"/>
                   </a:solidFill>
@@ -1898,7 +1898,7 @@
             </a:ln>
             <a:extLst>
               <a:ext uri="{91240B29-F687-4f45-9708-019B960494DF}">
-                <a14:hiddenLine xmlns="" xmlns:a14="http://schemas.microsoft.com/office/drawing/2010/main" w="9525">
+                <a14:hiddenLine xmlns:a14="http://schemas.microsoft.com/office/drawing/2010/main" xmlns="" w="9525">
                   <a:solidFill>
                     <a:srgbClr val="000000"/>
                   </a:solidFill>
@@ -1988,7 +1988,7 @@
             </a:ln>
             <a:extLst>
               <a:ext uri="{91240B29-F687-4f45-9708-019B960494DF}">
-                <a14:hiddenLine xmlns="" xmlns:a14="http://schemas.microsoft.com/office/drawing/2010/main" w="9525">
+                <a14:hiddenLine xmlns:a14="http://schemas.microsoft.com/office/drawing/2010/main" xmlns="" w="9525">
                   <a:solidFill>
                     <a:srgbClr val="000000"/>
                   </a:solidFill>
@@ -2078,7 +2078,7 @@
             </a:ln>
             <a:extLst>
               <a:ext uri="{91240B29-F687-4f45-9708-019B960494DF}">
-                <a14:hiddenLine xmlns="" xmlns:a14="http://schemas.microsoft.com/office/drawing/2010/main" w="9525">
+                <a14:hiddenLine xmlns:a14="http://schemas.microsoft.com/office/drawing/2010/main" xmlns="" w="9525">
                   <a:solidFill>
                     <a:srgbClr val="000000"/>
                   </a:solidFill>
@@ -2140,7 +2140,7 @@
             </a:ln>
             <a:extLst>
               <a:ext uri="{91240B29-F687-4f45-9708-019B960494DF}">
-                <a14:hiddenLine xmlns="" xmlns:a14="http://schemas.microsoft.com/office/drawing/2010/main" w="9525">
+                <a14:hiddenLine xmlns:a14="http://schemas.microsoft.com/office/drawing/2010/main" xmlns="" w="9525">
                   <a:solidFill>
                     <a:srgbClr val="000000"/>
                   </a:solidFill>
@@ -2250,7 +2250,7 @@
             </a:ln>
             <a:extLst>
               <a:ext uri="{91240B29-F687-4f45-9708-019B960494DF}">
-                <a14:hiddenLine xmlns="" xmlns:a14="http://schemas.microsoft.com/office/drawing/2010/main" w="9525">
+                <a14:hiddenLine xmlns:a14="http://schemas.microsoft.com/office/drawing/2010/main" xmlns="" w="9525">
                   <a:solidFill>
                     <a:srgbClr val="000000"/>
                   </a:solidFill>
@@ -2312,7 +2312,7 @@
             </a:ln>
             <a:extLst>
               <a:ext uri="{91240B29-F687-4f45-9708-019B960494DF}">
-                <a14:hiddenLine xmlns="" xmlns:a14="http://schemas.microsoft.com/office/drawing/2010/main" w="9525">
+                <a14:hiddenLine xmlns:a14="http://schemas.microsoft.com/office/drawing/2010/main" xmlns="" w="9525">
                   <a:solidFill>
                     <a:srgbClr val="000000"/>
                   </a:solidFill>
@@ -2402,7 +2402,7 @@
             </a:ln>
             <a:extLst>
               <a:ext uri="{91240B29-F687-4f45-9708-019B960494DF}">
-                <a14:hiddenLine xmlns="" xmlns:a14="http://schemas.microsoft.com/office/drawing/2010/main" w="9525">
+                <a14:hiddenLine xmlns:a14="http://schemas.microsoft.com/office/drawing/2010/main" xmlns="" w="9525">
                   <a:solidFill>
                     <a:srgbClr val="000000"/>
                   </a:solidFill>
@@ -2492,7 +2492,7 @@
             </a:ln>
             <a:extLst>
               <a:ext uri="{91240B29-F687-4f45-9708-019B960494DF}">
-                <a14:hiddenLine xmlns="" xmlns:a14="http://schemas.microsoft.com/office/drawing/2010/main" w="9525">
+                <a14:hiddenLine xmlns:a14="http://schemas.microsoft.com/office/drawing/2010/main" xmlns="" w="9525">
                   <a:solidFill>
                     <a:srgbClr val="000000"/>
                   </a:solidFill>
@@ -2554,7 +2554,7 @@
             </a:ln>
             <a:extLst>
               <a:ext uri="{91240B29-F687-4f45-9708-019B960494DF}">
-                <a14:hiddenLine xmlns="" xmlns:a14="http://schemas.microsoft.com/office/drawing/2010/main" w="9525">
+                <a14:hiddenLine xmlns:a14="http://schemas.microsoft.com/office/drawing/2010/main" xmlns="" w="9525">
                   <a:solidFill>
                     <a:srgbClr val="000000"/>
                   </a:solidFill>
@@ -2644,7 +2644,7 @@
             </a:ln>
             <a:extLst>
               <a:ext uri="{91240B29-F687-4f45-9708-019B960494DF}">
-                <a14:hiddenLine xmlns="" xmlns:a14="http://schemas.microsoft.com/office/drawing/2010/main" w="9525">
+                <a14:hiddenLine xmlns:a14="http://schemas.microsoft.com/office/drawing/2010/main" xmlns="" w="9525">
                   <a:solidFill>
                     <a:srgbClr val="000000"/>
                   </a:solidFill>
@@ -2734,7 +2734,7 @@
             </a:ln>
             <a:extLst>
               <a:ext uri="{91240B29-F687-4f45-9708-019B960494DF}">
-                <a14:hiddenLine xmlns="" xmlns:a14="http://schemas.microsoft.com/office/drawing/2010/main" w="9525">
+                <a14:hiddenLine xmlns:a14="http://schemas.microsoft.com/office/drawing/2010/main" xmlns="" w="9525">
                   <a:solidFill>
                     <a:srgbClr val="000000"/>
                   </a:solidFill>
@@ -2790,7 +2790,7 @@
             </a:ln>
             <a:extLst>
               <a:ext uri="{91240B29-F687-4f45-9708-019B960494DF}">
-                <a14:hiddenLine xmlns="" xmlns:a14="http://schemas.microsoft.com/office/drawing/2010/main" w="9525">
+                <a14:hiddenLine xmlns:a14="http://schemas.microsoft.com/office/drawing/2010/main" xmlns="" w="9525">
                   <a:solidFill>
                     <a:srgbClr val="000000"/>
                   </a:solidFill>
@@ -2880,7 +2880,7 @@
             </a:ln>
             <a:extLst>
               <a:ext uri="{91240B29-F687-4f45-9708-019B960494DF}">
-                <a14:hiddenLine xmlns="" xmlns:a14="http://schemas.microsoft.com/office/drawing/2010/main" w="9525">
+                <a14:hiddenLine xmlns:a14="http://schemas.microsoft.com/office/drawing/2010/main" xmlns="" w="9525">
                   <a:solidFill>
                     <a:srgbClr val="000000"/>
                   </a:solidFill>
@@ -2936,7 +2936,7 @@
             </a:ln>
             <a:extLst>
               <a:ext uri="{91240B29-F687-4f45-9708-019B960494DF}">
-                <a14:hiddenLine xmlns="" xmlns:a14="http://schemas.microsoft.com/office/drawing/2010/main" w="9525">
+                <a14:hiddenLine xmlns:a14="http://schemas.microsoft.com/office/drawing/2010/main" xmlns="" w="9525">
                   <a:solidFill>
                     <a:srgbClr val="000000"/>
                   </a:solidFill>
@@ -3026,7 +3026,7 @@
             </a:ln>
             <a:extLst>
               <a:ext uri="{91240B29-F687-4f45-9708-019B960494DF}">
-                <a14:hiddenLine xmlns="" xmlns:a14="http://schemas.microsoft.com/office/drawing/2010/main" w="9525">
+                <a14:hiddenLine xmlns:a14="http://schemas.microsoft.com/office/drawing/2010/main" xmlns="" w="9525">
                   <a:solidFill>
                     <a:srgbClr val="000000"/>
                   </a:solidFill>
@@ -3094,7 +3094,7 @@
             </a:ln>
             <a:extLst>
               <a:ext uri="{91240B29-F687-4f45-9708-019B960494DF}">
-                <a14:hiddenLine xmlns="" xmlns:a14="http://schemas.microsoft.com/office/drawing/2010/main" w="9525">
+                <a14:hiddenLine xmlns:a14="http://schemas.microsoft.com/office/drawing/2010/main" xmlns="" w="9525">
                   <a:solidFill>
                     <a:srgbClr val="000000"/>
                   </a:solidFill>
@@ -3184,7 +3184,7 @@
             </a:ln>
             <a:extLst>
               <a:ext uri="{91240B29-F687-4f45-9708-019B960494DF}">
-                <a14:hiddenLine xmlns="" xmlns:a14="http://schemas.microsoft.com/office/drawing/2010/main" w="9525">
+                <a14:hiddenLine xmlns:a14="http://schemas.microsoft.com/office/drawing/2010/main" xmlns="" w="9525">
                   <a:solidFill>
                     <a:srgbClr val="000000"/>
                   </a:solidFill>
@@ -3252,7 +3252,7 @@
             </a:ln>
             <a:extLst>
               <a:ext uri="{91240B29-F687-4f45-9708-019B960494DF}">
-                <a14:hiddenLine xmlns="" xmlns:a14="http://schemas.microsoft.com/office/drawing/2010/main" w="9525">
+                <a14:hiddenLine xmlns:a14="http://schemas.microsoft.com/office/drawing/2010/main" xmlns="" w="9525">
                   <a:solidFill>
                     <a:srgbClr val="000000"/>
                   </a:solidFill>
@@ -3342,7 +3342,7 @@
             </a:ln>
             <a:extLst>
               <a:ext uri="{91240B29-F687-4f45-9708-019B960494DF}">
-                <a14:hiddenLine xmlns="" xmlns:a14="http://schemas.microsoft.com/office/drawing/2010/main" w="9525">
+                <a14:hiddenLine xmlns:a14="http://schemas.microsoft.com/office/drawing/2010/main" xmlns="" w="9525">
                   <a:solidFill>
                     <a:srgbClr val="000000"/>
                   </a:solidFill>
@@ -3376,7 +3376,7 @@
             </a:ln>
             <a:extLst>
               <a:ext uri="{91240B29-F687-4f45-9708-019B960494DF}">
-                <a14:hiddenLine xmlns="" xmlns:a14="http://schemas.microsoft.com/office/drawing/2010/main" w="9525">
+                <a14:hiddenLine xmlns:a14="http://schemas.microsoft.com/office/drawing/2010/main" xmlns="" w="9525">
                   <a:solidFill>
                     <a:srgbClr val="000000"/>
                   </a:solidFill>
@@ -3466,7 +3466,7 @@
             </a:ln>
             <a:extLst>
               <a:ext uri="{91240B29-F687-4f45-9708-019B960494DF}">
-                <a14:hiddenLine xmlns="" xmlns:a14="http://schemas.microsoft.com/office/drawing/2010/main" w="9525">
+                <a14:hiddenLine xmlns:a14="http://schemas.microsoft.com/office/drawing/2010/main" xmlns="" w="9525">
                   <a:solidFill>
                     <a:srgbClr val="000000"/>
                   </a:solidFill>
@@ -3528,7 +3528,7 @@
             </a:ln>
             <a:extLst>
               <a:ext uri="{91240B29-F687-4f45-9708-019B960494DF}">
-                <a14:hiddenLine xmlns="" xmlns:a14="http://schemas.microsoft.com/office/drawing/2010/main" w="9525">
+                <a14:hiddenLine xmlns:a14="http://schemas.microsoft.com/office/drawing/2010/main" xmlns="" w="9525">
                   <a:solidFill>
                     <a:srgbClr val="000000"/>
                   </a:solidFill>
@@ -3590,7 +3590,7 @@
             </a:ln>
             <a:extLst>
               <a:ext uri="{91240B29-F687-4f45-9708-019B960494DF}">
-                <a14:hiddenLine xmlns="" xmlns:a14="http://schemas.microsoft.com/office/drawing/2010/main" w="9525">
+                <a14:hiddenLine xmlns:a14="http://schemas.microsoft.com/office/drawing/2010/main" xmlns="" w="9525">
                   <a:solidFill>
                     <a:srgbClr val="000000"/>
                   </a:solidFill>
@@ -3680,7 +3680,7 @@
             </a:ln>
             <a:extLst>
               <a:ext uri="{91240B29-F687-4f45-9708-019B960494DF}">
-                <a14:hiddenLine xmlns="" xmlns:a14="http://schemas.microsoft.com/office/drawing/2010/main" w="9525">
+                <a14:hiddenLine xmlns:a14="http://schemas.microsoft.com/office/drawing/2010/main" xmlns="" w="9525">
                   <a:solidFill>
                     <a:srgbClr val="000000"/>
                   </a:solidFill>
@@ -3748,7 +3748,7 @@
             </a:ln>
             <a:extLst>
               <a:ext uri="{91240B29-F687-4f45-9708-019B960494DF}">
-                <a14:hiddenLine xmlns="" xmlns:a14="http://schemas.microsoft.com/office/drawing/2010/main" w="9525">
+                <a14:hiddenLine xmlns:a14="http://schemas.microsoft.com/office/drawing/2010/main" xmlns="" w="9525">
                   <a:solidFill>
                     <a:srgbClr val="000000"/>
                   </a:solidFill>
@@ -3810,7 +3810,7 @@
             </a:ln>
             <a:extLst>
               <a:ext uri="{91240B29-F687-4f45-9708-019B960494DF}">
-                <a14:hiddenLine xmlns="" xmlns:a14="http://schemas.microsoft.com/office/drawing/2010/main" w="9525">
+                <a14:hiddenLine xmlns:a14="http://schemas.microsoft.com/office/drawing/2010/main" xmlns="" w="9525">
                   <a:solidFill>
                     <a:srgbClr val="000000"/>
                   </a:solidFill>
@@ -3900,7 +3900,7 @@
             </a:ln>
             <a:extLst>
               <a:ext uri="{91240B29-F687-4f45-9708-019B960494DF}">
-                <a14:hiddenLine xmlns="" xmlns:a14="http://schemas.microsoft.com/office/drawing/2010/main" w="9525">
+                <a14:hiddenLine xmlns:a14="http://schemas.microsoft.com/office/drawing/2010/main" xmlns="" w="9525">
                   <a:solidFill>
                     <a:srgbClr val="000000"/>
                   </a:solidFill>
@@ -3962,7 +3962,7 @@
             </a:ln>
             <a:extLst>
               <a:ext uri="{91240B29-F687-4f45-9708-019B960494DF}">
-                <a14:hiddenLine xmlns="" xmlns:a14="http://schemas.microsoft.com/office/drawing/2010/main" w="9525">
+                <a14:hiddenLine xmlns:a14="http://schemas.microsoft.com/office/drawing/2010/main" xmlns="" w="9525">
                   <a:solidFill>
                     <a:srgbClr val="000000"/>
                   </a:solidFill>
@@ -4052,7 +4052,7 @@
             </a:ln>
             <a:extLst>
               <a:ext uri="{91240B29-F687-4f45-9708-019B960494DF}">
-                <a14:hiddenLine xmlns="" xmlns:a14="http://schemas.microsoft.com/office/drawing/2010/main" w="9525">
+                <a14:hiddenLine xmlns:a14="http://schemas.microsoft.com/office/drawing/2010/main" xmlns="" w="9525">
                   <a:solidFill>
                     <a:srgbClr val="000000"/>
                   </a:solidFill>
@@ -4114,7 +4114,7 @@
             </a:ln>
             <a:extLst>
               <a:ext uri="{91240B29-F687-4f45-9708-019B960494DF}">
-                <a14:hiddenLine xmlns="" xmlns:a14="http://schemas.microsoft.com/office/drawing/2010/main" w="9525">
+                <a14:hiddenLine xmlns:a14="http://schemas.microsoft.com/office/drawing/2010/main" xmlns="" w="9525">
                   <a:solidFill>
                     <a:srgbClr val="000000"/>
                   </a:solidFill>
@@ -4204,7 +4204,7 @@
             </a:ln>
             <a:extLst>
               <a:ext uri="{91240B29-F687-4f45-9708-019B960494DF}">
-                <a14:hiddenLine xmlns="" xmlns:a14="http://schemas.microsoft.com/office/drawing/2010/main" w="9525">
+                <a14:hiddenLine xmlns:a14="http://schemas.microsoft.com/office/drawing/2010/main" xmlns="" w="9525">
                   <a:solidFill>
                     <a:srgbClr val="000000"/>
                   </a:solidFill>
@@ -4238,7 +4238,7 @@
             </a:ln>
             <a:extLst>
               <a:ext uri="{91240B29-F687-4f45-9708-019B960494DF}">
-                <a14:hiddenLine xmlns="" xmlns:a14="http://schemas.microsoft.com/office/drawing/2010/main" w="9525">
+                <a14:hiddenLine xmlns:a14="http://schemas.microsoft.com/office/drawing/2010/main" xmlns="" w="9525">
                   <a:solidFill>
                     <a:srgbClr val="000000"/>
                   </a:solidFill>
@@ -4303,7 +4303,7 @@
             </a:ln>
             <a:extLst>
               <a:ext uri="{91240B29-F687-4f45-9708-019B960494DF}">
-                <a14:hiddenLine xmlns="" xmlns:a14="http://schemas.microsoft.com/office/drawing/2010/main" w="9525">
+                <a14:hiddenLine xmlns:a14="http://schemas.microsoft.com/office/drawing/2010/main" xmlns="" w="9525">
                   <a:solidFill>
                     <a:srgbClr val="000000"/>
                   </a:solidFill>
@@ -4393,7 +4393,7 @@
             </a:ln>
             <a:extLst>
               <a:ext uri="{91240B29-F687-4f45-9708-019B960494DF}">
-                <a14:hiddenLine xmlns="" xmlns:a14="http://schemas.microsoft.com/office/drawing/2010/main" w="9525">
+                <a14:hiddenLine xmlns:a14="http://schemas.microsoft.com/office/drawing/2010/main" xmlns="" w="9525">
                   <a:solidFill>
                     <a:srgbClr val="000000"/>
                   </a:solidFill>
@@ -4455,7 +4455,7 @@
             </a:ln>
             <a:extLst>
               <a:ext uri="{91240B29-F687-4f45-9708-019B960494DF}">
-                <a14:hiddenLine xmlns="" xmlns:a14="http://schemas.microsoft.com/office/drawing/2010/main" w="9525">
+                <a14:hiddenLine xmlns:a14="http://schemas.microsoft.com/office/drawing/2010/main" xmlns="" w="9525">
                   <a:solidFill>
                     <a:srgbClr val="000000"/>
                   </a:solidFill>
@@ -4545,7 +4545,7 @@
             </a:ln>
             <a:extLst>
               <a:ext uri="{91240B29-F687-4f45-9708-019B960494DF}">
-                <a14:hiddenLine xmlns="" xmlns:a14="http://schemas.microsoft.com/office/drawing/2010/main" w="9525">
+                <a14:hiddenLine xmlns:a14="http://schemas.microsoft.com/office/drawing/2010/main" xmlns="" w="9525">
                   <a:solidFill>
                     <a:srgbClr val="000000"/>
                   </a:solidFill>
@@ -4635,7 +4635,7 @@
             </a:ln>
             <a:extLst>
               <a:ext uri="{91240B29-F687-4f45-9708-019B960494DF}">
-                <a14:hiddenLine xmlns="" xmlns:a14="http://schemas.microsoft.com/office/drawing/2010/main" w="9525">
+                <a14:hiddenLine xmlns:a14="http://schemas.microsoft.com/office/drawing/2010/main" xmlns="" w="9525">
                   <a:solidFill>
                     <a:srgbClr val="000000"/>
                   </a:solidFill>
@@ -4700,7 +4700,7 @@
             </a:ln>
             <a:extLst>
               <a:ext uri="{91240B29-F687-4f45-9708-019B960494DF}">
-                <a14:hiddenLine xmlns="" xmlns:a14="http://schemas.microsoft.com/office/drawing/2010/main" w="9525">
+                <a14:hiddenLine xmlns:a14="http://schemas.microsoft.com/office/drawing/2010/main" xmlns="" w="9525">
                   <a:solidFill>
                     <a:srgbClr val="000000"/>
                   </a:solidFill>
@@ -4762,7 +4762,7 @@
             </a:ln>
             <a:extLst>
               <a:ext uri="{91240B29-F687-4f45-9708-019B960494DF}">
-                <a14:hiddenLine xmlns="" xmlns:a14="http://schemas.microsoft.com/office/drawing/2010/main" w="9525">
+                <a14:hiddenLine xmlns:a14="http://schemas.microsoft.com/office/drawing/2010/main" xmlns="" w="9525">
                   <a:solidFill>
                     <a:srgbClr val="000000"/>
                   </a:solidFill>
@@ -4852,7 +4852,7 @@
             </a:ln>
             <a:extLst>
               <a:ext uri="{91240B29-F687-4f45-9708-019B960494DF}">
-                <a14:hiddenLine xmlns="" xmlns:a14="http://schemas.microsoft.com/office/drawing/2010/main" w="9525">
+                <a14:hiddenLine xmlns:a14="http://schemas.microsoft.com/office/drawing/2010/main" xmlns="" w="9525">
                   <a:solidFill>
                     <a:srgbClr val="000000"/>
                   </a:solidFill>
@@ -4942,7 +4942,7 @@
             </a:ln>
             <a:extLst>
               <a:ext uri="{91240B29-F687-4f45-9708-019B960494DF}">
-                <a14:hiddenLine xmlns="" xmlns:a14="http://schemas.microsoft.com/office/drawing/2010/main" w="9525">
+                <a14:hiddenLine xmlns:a14="http://schemas.microsoft.com/office/drawing/2010/main" xmlns="" w="9525">
                   <a:solidFill>
                     <a:srgbClr val="000000"/>
                   </a:solidFill>
@@ -5004,7 +5004,7 @@
             </a:ln>
             <a:extLst>
               <a:ext uri="{91240B29-F687-4f45-9708-019B960494DF}">
-                <a14:hiddenLine xmlns="" xmlns:a14="http://schemas.microsoft.com/office/drawing/2010/main" w="9525">
+                <a14:hiddenLine xmlns:a14="http://schemas.microsoft.com/office/drawing/2010/main" xmlns="" w="9525">
                   <a:solidFill>
                     <a:srgbClr val="000000"/>
                   </a:solidFill>
@@ -5124,7 +5124,7 @@
             </a:ln>
             <a:extLst>
               <a:ext uri="{91240B29-F687-4f45-9708-019B960494DF}">
-                <a14:hiddenLine xmlns="" xmlns:a14="http://schemas.microsoft.com/office/drawing/2010/main" w="9525">
+                <a14:hiddenLine xmlns:a14="http://schemas.microsoft.com/office/drawing/2010/main" xmlns="" w="9525">
                   <a:solidFill>
                     <a:srgbClr val="000000"/>
                   </a:solidFill>
@@ -5192,7 +5192,7 @@
             </a:ln>
             <a:extLst>
               <a:ext uri="{91240B29-F687-4f45-9708-019B960494DF}">
-                <a14:hiddenLine xmlns="" xmlns:a14="http://schemas.microsoft.com/office/drawing/2010/main" w="9525">
+                <a14:hiddenLine xmlns:a14="http://schemas.microsoft.com/office/drawing/2010/main" xmlns="" w="9525">
                   <a:solidFill>
                     <a:srgbClr val="000000"/>
                   </a:solidFill>
@@ -5282,7 +5282,7 @@
             </a:ln>
             <a:extLst>
               <a:ext uri="{91240B29-F687-4f45-9708-019B960494DF}">
-                <a14:hiddenLine xmlns="" xmlns:a14="http://schemas.microsoft.com/office/drawing/2010/main" w="9525">
+                <a14:hiddenLine xmlns:a14="http://schemas.microsoft.com/office/drawing/2010/main" xmlns="" w="9525">
                   <a:solidFill>
                     <a:srgbClr val="000000"/>
                   </a:solidFill>
@@ -5422,7 +5422,7 @@
           <a:p>
             <a:fld id="{EC4347D3-4C9A-C240-8F14-750059DFEEB0}" type="datetimeFigureOut">
               <a:rPr lang="en-US" smtClean="0"/>
-              <a:t>8/9/23</a:t>
+              <a:t>8/22/23</a:t>
             </a:fld>
             <a:endParaRPr lang="en-US"/>
           </a:p>
@@ -5689,7 +5689,7 @@
           <a:p>
             <a:fld id="{EC4347D3-4C9A-C240-8F14-750059DFEEB0}" type="datetimeFigureOut">
               <a:rPr lang="en-US" smtClean="0"/>
-              <a:t>8/9/23</a:t>
+              <a:t>8/22/23</a:t>
             </a:fld>
             <a:endParaRPr lang="en-US"/>
           </a:p>
@@ -5885,7 +5885,7 @@
           <a:p>
             <a:fld id="{EC4347D3-4C9A-C240-8F14-750059DFEEB0}" type="datetimeFigureOut">
               <a:rPr lang="en-US" smtClean="0"/>
-              <a:t>8/9/23</a:t>
+              <a:t>8/22/23</a:t>
             </a:fld>
             <a:endParaRPr lang="en-US"/>
           </a:p>
@@ -6148,7 +6148,7 @@
           <a:p>
             <a:fld id="{EC4347D3-4C9A-C240-8F14-750059DFEEB0}" type="datetimeFigureOut">
               <a:rPr lang="en-US" smtClean="0"/>
-              <a:t>8/9/23</a:t>
+              <a:t>8/22/23</a:t>
             </a:fld>
             <a:endParaRPr lang="en-US"/>
           </a:p>
@@ -6582,7 +6582,7 @@
           <a:p>
             <a:fld id="{EC4347D3-4C9A-C240-8F14-750059DFEEB0}" type="datetimeFigureOut">
               <a:rPr lang="en-US" smtClean="0"/>
-              <a:t>8/9/23</a:t>
+              <a:t>8/22/23</a:t>
             </a:fld>
             <a:endParaRPr lang="en-US"/>
           </a:p>
@@ -7128,7 +7128,7 @@
           <a:p>
             <a:fld id="{EC4347D3-4C9A-C240-8F14-750059DFEEB0}" type="datetimeFigureOut">
               <a:rPr lang="en-US" smtClean="0"/>
-              <a:t>8/9/23</a:t>
+              <a:t>8/22/23</a:t>
             </a:fld>
             <a:endParaRPr lang="en-US"/>
           </a:p>
@@ -7848,7 +7848,7 @@
           <a:p>
             <a:fld id="{EC4347D3-4C9A-C240-8F14-750059DFEEB0}" type="datetimeFigureOut">
               <a:rPr lang="en-US" smtClean="0"/>
-              <a:t>8/9/23</a:t>
+              <a:t>8/22/23</a:t>
             </a:fld>
             <a:endParaRPr lang="en-US"/>
           </a:p>
@@ -8018,7 +8018,7 @@
           <a:p>
             <a:fld id="{EC4347D3-4C9A-C240-8F14-750059DFEEB0}" type="datetimeFigureOut">
               <a:rPr lang="en-US" smtClean="0"/>
-              <a:t>8/9/23</a:t>
+              <a:t>8/22/23</a:t>
             </a:fld>
             <a:endParaRPr lang="en-US"/>
           </a:p>
@@ -8198,7 +8198,7 @@
           <a:p>
             <a:fld id="{EC4347D3-4C9A-C240-8F14-750059DFEEB0}" type="datetimeFigureOut">
               <a:rPr lang="en-US" smtClean="0"/>
-              <a:t>8/9/23</a:t>
+              <a:t>8/22/23</a:t>
             </a:fld>
             <a:endParaRPr lang="en-US"/>
           </a:p>
@@ -8368,7 +8368,7 @@
           <a:p>
             <a:fld id="{EC4347D3-4C9A-C240-8F14-750059DFEEB0}" type="datetimeFigureOut">
               <a:rPr lang="en-US" smtClean="0"/>
-              <a:t>8/9/23</a:t>
+              <a:t>8/22/23</a:t>
             </a:fld>
             <a:endParaRPr lang="en-US"/>
           </a:p>
@@ -8618,7 +8618,7 @@
           <a:p>
             <a:fld id="{EC4347D3-4C9A-C240-8F14-750059DFEEB0}" type="datetimeFigureOut">
               <a:rPr lang="en-US" smtClean="0"/>
-              <a:t>8/9/23</a:t>
+              <a:t>8/22/23</a:t>
             </a:fld>
             <a:endParaRPr lang="en-US"/>
           </a:p>
@@ -8850,7 +8850,7 @@
           <a:p>
             <a:fld id="{EC4347D3-4C9A-C240-8F14-750059DFEEB0}" type="datetimeFigureOut">
               <a:rPr lang="en-US" smtClean="0"/>
-              <a:t>8/9/23</a:t>
+              <a:t>8/22/23</a:t>
             </a:fld>
             <a:endParaRPr lang="en-US"/>
           </a:p>
@@ -9236,7 +9236,7 @@
           <a:p>
             <a:fld id="{EC4347D3-4C9A-C240-8F14-750059DFEEB0}" type="datetimeFigureOut">
               <a:rPr lang="en-US" smtClean="0"/>
-              <a:t>8/9/23</a:t>
+              <a:t>8/22/23</a:t>
             </a:fld>
             <a:endParaRPr lang="en-US"/>
           </a:p>
@@ -9359,7 +9359,7 @@
           <a:p>
             <a:fld id="{EC4347D3-4C9A-C240-8F14-750059DFEEB0}" type="datetimeFigureOut">
               <a:rPr lang="en-US" smtClean="0"/>
-              <a:t>8/9/23</a:t>
+              <a:t>8/22/23</a:t>
             </a:fld>
             <a:endParaRPr lang="en-US"/>
           </a:p>
@@ -9454,7 +9454,7 @@
           <a:p>
             <a:fld id="{EC4347D3-4C9A-C240-8F14-750059DFEEB0}" type="datetimeFigureOut">
               <a:rPr lang="en-US" smtClean="0"/>
-              <a:t>8/9/23</a:t>
+              <a:t>8/22/23</a:t>
             </a:fld>
             <a:endParaRPr lang="en-US"/>
           </a:p>
@@ -9703,7 +9703,7 @@
           <a:p>
             <a:fld id="{EC4347D3-4C9A-C240-8F14-750059DFEEB0}" type="datetimeFigureOut">
               <a:rPr lang="en-US" smtClean="0"/>
-              <a:t>8/9/23</a:t>
+              <a:t>8/22/23</a:t>
             </a:fld>
             <a:endParaRPr lang="en-US"/>
           </a:p>
@@ -9988,7 +9988,7 @@
           <a:p>
             <a:fld id="{EC4347D3-4C9A-C240-8F14-750059DFEEB0}" type="datetimeFigureOut">
               <a:rPr lang="en-US" smtClean="0"/>
-              <a:t>8/9/23</a:t>
+              <a:t>8/22/23</a:t>
             </a:fld>
             <a:endParaRPr lang="en-US"/>
           </a:p>
@@ -10111,7 +10111,7 @@
           <a:noFill/>
           <a:extLst>
             <a:ext uri="{909E8E84-426E-40dd-AFC4-6F175D3DCCD1}">
-              <a14:hiddenFill xmlns="" xmlns:a14="http://schemas.microsoft.com/office/drawing/2010/main">
+              <a14:hiddenFill xmlns:a14="http://schemas.microsoft.com/office/drawing/2010/main" xmlns="">
                 <a:solidFill>
                   <a:srgbClr val="FFFFFF"/>
                 </a:solidFill>
@@ -10185,7 +10185,7 @@
               </a:ln>
               <a:extLst>
                 <a:ext uri="{91240B29-F687-4f45-9708-019B960494DF}">
-                  <a14:hiddenLine xmlns="" xmlns:a14="http://schemas.microsoft.com/office/drawing/2010/main" w="9525">
+                  <a14:hiddenLine xmlns:a14="http://schemas.microsoft.com/office/drawing/2010/main" xmlns="" w="9525">
                     <a:solidFill>
                       <a:srgbClr val="000000"/>
                     </a:solidFill>
@@ -10275,7 +10275,7 @@
               </a:ln>
               <a:extLst>
                 <a:ext uri="{91240B29-F687-4f45-9708-019B960494DF}">
-                  <a14:hiddenLine xmlns="" xmlns:a14="http://schemas.microsoft.com/office/drawing/2010/main" w="9525">
+                  <a14:hiddenLine xmlns:a14="http://schemas.microsoft.com/office/drawing/2010/main" xmlns="" w="9525">
                     <a:solidFill>
                       <a:srgbClr val="000000"/>
                     </a:solidFill>
@@ -10365,7 +10365,7 @@
               </a:ln>
               <a:extLst>
                 <a:ext uri="{91240B29-F687-4f45-9708-019B960494DF}">
-                  <a14:hiddenLine xmlns="" xmlns:a14="http://schemas.microsoft.com/office/drawing/2010/main" w="9525">
+                  <a14:hiddenLine xmlns:a14="http://schemas.microsoft.com/office/drawing/2010/main" xmlns="" w="9525">
                     <a:solidFill>
                       <a:srgbClr val="000000"/>
                     </a:solidFill>
@@ -10427,7 +10427,7 @@
               </a:ln>
               <a:extLst>
                 <a:ext uri="{91240B29-F687-4f45-9708-019B960494DF}">
-                  <a14:hiddenLine xmlns="" xmlns:a14="http://schemas.microsoft.com/office/drawing/2010/main" w="9525">
+                  <a14:hiddenLine xmlns:a14="http://schemas.microsoft.com/office/drawing/2010/main" xmlns="" w="9525">
                     <a:solidFill>
                       <a:srgbClr val="000000"/>
                     </a:solidFill>
@@ -10517,7 +10517,7 @@
               </a:ln>
               <a:extLst>
                 <a:ext uri="{91240B29-F687-4f45-9708-019B960494DF}">
-                  <a14:hiddenLine xmlns="" xmlns:a14="http://schemas.microsoft.com/office/drawing/2010/main" w="9525">
+                  <a14:hiddenLine xmlns:a14="http://schemas.microsoft.com/office/drawing/2010/main" xmlns="" w="9525">
                     <a:solidFill>
                       <a:srgbClr val="000000"/>
                     </a:solidFill>
@@ -10579,7 +10579,7 @@
               </a:ln>
               <a:extLst>
                 <a:ext uri="{91240B29-F687-4f45-9708-019B960494DF}">
-                  <a14:hiddenLine xmlns="" xmlns:a14="http://schemas.microsoft.com/office/drawing/2010/main" w="9525">
+                  <a14:hiddenLine xmlns:a14="http://schemas.microsoft.com/office/drawing/2010/main" xmlns="" w="9525">
                     <a:solidFill>
                       <a:srgbClr val="000000"/>
                     </a:solidFill>
@@ -10641,7 +10641,7 @@
               </a:ln>
               <a:extLst>
                 <a:ext uri="{91240B29-F687-4f45-9708-019B960494DF}">
-                  <a14:hiddenLine xmlns="" xmlns:a14="http://schemas.microsoft.com/office/drawing/2010/main" w="9525">
+                  <a14:hiddenLine xmlns:a14="http://schemas.microsoft.com/office/drawing/2010/main" xmlns="" w="9525">
                     <a:solidFill>
                       <a:srgbClr val="000000"/>
                     </a:solidFill>
@@ -10731,7 +10731,7 @@
               </a:ln>
               <a:extLst>
                 <a:ext uri="{91240B29-F687-4f45-9708-019B960494DF}">
-                  <a14:hiddenLine xmlns="" xmlns:a14="http://schemas.microsoft.com/office/drawing/2010/main" w="9525">
+                  <a14:hiddenLine xmlns:a14="http://schemas.microsoft.com/office/drawing/2010/main" xmlns="" w="9525">
                     <a:solidFill>
                       <a:srgbClr val="000000"/>
                     </a:solidFill>
@@ -10821,7 +10821,7 @@
               </a:ln>
               <a:extLst>
                 <a:ext uri="{91240B29-F687-4f45-9708-019B960494DF}">
-                  <a14:hiddenLine xmlns="" xmlns:a14="http://schemas.microsoft.com/office/drawing/2010/main" w="9525">
+                  <a14:hiddenLine xmlns:a14="http://schemas.microsoft.com/office/drawing/2010/main" xmlns="" w="9525">
                     <a:solidFill>
                       <a:srgbClr val="000000"/>
                     </a:solidFill>
@@ -10883,7 +10883,7 @@
               </a:ln>
               <a:extLst>
                 <a:ext uri="{91240B29-F687-4f45-9708-019B960494DF}">
-                  <a14:hiddenLine xmlns="" xmlns:a14="http://schemas.microsoft.com/office/drawing/2010/main" w="9525">
+                  <a14:hiddenLine xmlns:a14="http://schemas.microsoft.com/office/drawing/2010/main" xmlns="" w="9525">
                     <a:solidFill>
                       <a:srgbClr val="000000"/>
                     </a:solidFill>
@@ -10993,7 +10993,7 @@
               </a:ln>
               <a:extLst>
                 <a:ext uri="{91240B29-F687-4f45-9708-019B960494DF}">
-                  <a14:hiddenLine xmlns="" xmlns:a14="http://schemas.microsoft.com/office/drawing/2010/main" w="9525">
+                  <a14:hiddenLine xmlns:a14="http://schemas.microsoft.com/office/drawing/2010/main" xmlns="" w="9525">
                     <a:solidFill>
                       <a:srgbClr val="000000"/>
                     </a:solidFill>
@@ -11077,7 +11077,7 @@
               </a:ln>
               <a:extLst>
                 <a:ext uri="{91240B29-F687-4f45-9708-019B960494DF}">
-                  <a14:hiddenLine xmlns="" xmlns:a14="http://schemas.microsoft.com/office/drawing/2010/main" w="9525">
+                  <a14:hiddenLine xmlns:a14="http://schemas.microsoft.com/office/drawing/2010/main" xmlns="" w="9525">
                     <a:solidFill>
                       <a:srgbClr val="000000"/>
                     </a:solidFill>
@@ -11139,7 +11139,7 @@
               </a:ln>
               <a:extLst>
                 <a:ext uri="{91240B29-F687-4f45-9708-019B960494DF}">
-                  <a14:hiddenLine xmlns="" xmlns:a14="http://schemas.microsoft.com/office/drawing/2010/main" w="9525">
+                  <a14:hiddenLine xmlns:a14="http://schemas.microsoft.com/office/drawing/2010/main" xmlns="" w="9525">
                     <a:solidFill>
                       <a:srgbClr val="000000"/>
                     </a:solidFill>
@@ -11201,7 +11201,7 @@
               </a:ln>
               <a:extLst>
                 <a:ext uri="{91240B29-F687-4f45-9708-019B960494DF}">
-                  <a14:hiddenLine xmlns="" xmlns:a14="http://schemas.microsoft.com/office/drawing/2010/main" w="9525">
+                  <a14:hiddenLine xmlns:a14="http://schemas.microsoft.com/office/drawing/2010/main" xmlns="" w="9525">
                     <a:solidFill>
                       <a:srgbClr val="000000"/>
                     </a:solidFill>
@@ -11291,7 +11291,7 @@
               </a:ln>
               <a:extLst>
                 <a:ext uri="{91240B29-F687-4f45-9708-019B960494DF}">
-                  <a14:hiddenLine xmlns="" xmlns:a14="http://schemas.microsoft.com/office/drawing/2010/main" w="9525">
+                  <a14:hiddenLine xmlns:a14="http://schemas.microsoft.com/office/drawing/2010/main" xmlns="" w="9525">
                     <a:solidFill>
                       <a:srgbClr val="000000"/>
                     </a:solidFill>
@@ -11325,7 +11325,7 @@
               </a:ln>
               <a:extLst>
                 <a:ext uri="{91240B29-F687-4f45-9708-019B960494DF}">
-                  <a14:hiddenLine xmlns="" xmlns:a14="http://schemas.microsoft.com/office/drawing/2010/main" w="9525">
+                  <a14:hiddenLine xmlns:a14="http://schemas.microsoft.com/office/drawing/2010/main" xmlns="" w="9525">
                     <a:solidFill>
                       <a:srgbClr val="000000"/>
                     </a:solidFill>
@@ -11390,7 +11390,7 @@
               </a:ln>
               <a:extLst>
                 <a:ext uri="{91240B29-F687-4f45-9708-019B960494DF}">
-                  <a14:hiddenLine xmlns="" xmlns:a14="http://schemas.microsoft.com/office/drawing/2010/main" w="9525">
+                  <a14:hiddenLine xmlns:a14="http://schemas.microsoft.com/office/drawing/2010/main" xmlns="" w="9525">
                     <a:solidFill>
                       <a:srgbClr val="000000"/>
                     </a:solidFill>
@@ -11480,7 +11480,7 @@
               </a:ln>
               <a:extLst>
                 <a:ext uri="{91240B29-F687-4f45-9708-019B960494DF}">
-                  <a14:hiddenLine xmlns="" xmlns:a14="http://schemas.microsoft.com/office/drawing/2010/main" w="9525">
+                  <a14:hiddenLine xmlns:a14="http://schemas.microsoft.com/office/drawing/2010/main" xmlns="" w="9525">
                     <a:solidFill>
                       <a:srgbClr val="000000"/>
                     </a:solidFill>
@@ -11542,7 +11542,7 @@
               </a:ln>
               <a:extLst>
                 <a:ext uri="{91240B29-F687-4f45-9708-019B960494DF}">
-                  <a14:hiddenLine xmlns="" xmlns:a14="http://schemas.microsoft.com/office/drawing/2010/main" w="9525">
+                  <a14:hiddenLine xmlns:a14="http://schemas.microsoft.com/office/drawing/2010/main" xmlns="" w="9525">
                     <a:solidFill>
                       <a:srgbClr val="000000"/>
                     </a:solidFill>
@@ -11632,7 +11632,7 @@
               </a:ln>
               <a:extLst>
                 <a:ext uri="{91240B29-F687-4f45-9708-019B960494DF}">
-                  <a14:hiddenLine xmlns="" xmlns:a14="http://schemas.microsoft.com/office/drawing/2010/main" w="9525">
+                  <a14:hiddenLine xmlns:a14="http://schemas.microsoft.com/office/drawing/2010/main" xmlns="" w="9525">
                     <a:solidFill>
                       <a:srgbClr val="000000"/>
                     </a:solidFill>
@@ -11697,7 +11697,7 @@
               </a:ln>
               <a:extLst>
                 <a:ext uri="{91240B29-F687-4f45-9708-019B960494DF}">
-                  <a14:hiddenLine xmlns="" xmlns:a14="http://schemas.microsoft.com/office/drawing/2010/main" w="9525">
+                  <a14:hiddenLine xmlns:a14="http://schemas.microsoft.com/office/drawing/2010/main" xmlns="" w="9525">
                     <a:solidFill>
                       <a:srgbClr val="000000"/>
                     </a:solidFill>
@@ -11759,7 +11759,7 @@
               </a:ln>
               <a:extLst>
                 <a:ext uri="{91240B29-F687-4f45-9708-019B960494DF}">
-                  <a14:hiddenLine xmlns="" xmlns:a14="http://schemas.microsoft.com/office/drawing/2010/main" w="9525">
+                  <a14:hiddenLine xmlns:a14="http://schemas.microsoft.com/office/drawing/2010/main" xmlns="" w="9525">
                     <a:solidFill>
                       <a:srgbClr val="000000"/>
                     </a:solidFill>
@@ -11849,7 +11849,7 @@
               </a:ln>
               <a:extLst>
                 <a:ext uri="{91240B29-F687-4f45-9708-019B960494DF}">
-                  <a14:hiddenLine xmlns="" xmlns:a14="http://schemas.microsoft.com/office/drawing/2010/main" w="9525">
+                  <a14:hiddenLine xmlns:a14="http://schemas.microsoft.com/office/drawing/2010/main" xmlns="" w="9525">
                     <a:solidFill>
                       <a:srgbClr val="000000"/>
                     </a:solidFill>
@@ -11939,7 +11939,7 @@
               </a:ln>
               <a:extLst>
                 <a:ext uri="{91240B29-F687-4f45-9708-019B960494DF}">
-                  <a14:hiddenLine xmlns="" xmlns:a14="http://schemas.microsoft.com/office/drawing/2010/main" w="9525">
+                  <a14:hiddenLine xmlns:a14="http://schemas.microsoft.com/office/drawing/2010/main" xmlns="" w="9525">
                     <a:solidFill>
                       <a:srgbClr val="000000"/>
                     </a:solidFill>
@@ -12004,7 +12004,7 @@
               </a:ln>
               <a:extLst>
                 <a:ext uri="{91240B29-F687-4f45-9708-019B960494DF}">
-                  <a14:hiddenLine xmlns="" xmlns:a14="http://schemas.microsoft.com/office/drawing/2010/main" w="9525">
+                  <a14:hiddenLine xmlns:a14="http://schemas.microsoft.com/office/drawing/2010/main" xmlns="" w="9525">
                     <a:solidFill>
                       <a:srgbClr val="000000"/>
                     </a:solidFill>
@@ -12124,7 +12124,7 @@
               </a:ln>
               <a:extLst>
                 <a:ext uri="{91240B29-F687-4f45-9708-019B960494DF}">
-                  <a14:hiddenLine xmlns="" xmlns:a14="http://schemas.microsoft.com/office/drawing/2010/main" w="9525">
+                  <a14:hiddenLine xmlns:a14="http://schemas.microsoft.com/office/drawing/2010/main" xmlns="" w="9525">
                     <a:solidFill>
                       <a:srgbClr val="000000"/>
                     </a:solidFill>
@@ -12205,7 +12205,7 @@
               </a:ln>
               <a:extLst>
                 <a:ext uri="{91240B29-F687-4f45-9708-019B960494DF}">
-                  <a14:hiddenLine xmlns="" xmlns:a14="http://schemas.microsoft.com/office/drawing/2010/main" w="9525">
+                  <a14:hiddenLine xmlns:a14="http://schemas.microsoft.com/office/drawing/2010/main" xmlns="" w="9525">
                     <a:solidFill>
                       <a:srgbClr val="000000"/>
                     </a:solidFill>
@@ -12320,7 +12320,7 @@
               </a:ln>
               <a:extLst>
                 <a:ext uri="{91240B29-F687-4f45-9708-019B960494DF}">
-                  <a14:hiddenLine xmlns="" xmlns:a14="http://schemas.microsoft.com/office/drawing/2010/main" w="9525">
+                  <a14:hiddenLine xmlns:a14="http://schemas.microsoft.com/office/drawing/2010/main" xmlns="" w="9525">
                     <a:solidFill>
                       <a:srgbClr val="000000"/>
                     </a:solidFill>
@@ -12410,7 +12410,7 @@
               </a:ln>
               <a:extLst>
                 <a:ext uri="{91240B29-F687-4f45-9708-019B960494DF}">
-                  <a14:hiddenLine xmlns="" xmlns:a14="http://schemas.microsoft.com/office/drawing/2010/main" w="9525">
+                  <a14:hiddenLine xmlns:a14="http://schemas.microsoft.com/office/drawing/2010/main" xmlns="" w="9525">
                     <a:solidFill>
                       <a:srgbClr val="000000"/>
                     </a:solidFill>
@@ -12475,7 +12475,7 @@
               </a:ln>
               <a:extLst>
                 <a:ext uri="{91240B29-F687-4f45-9708-019B960494DF}">
-                  <a14:hiddenLine xmlns="" xmlns:a14="http://schemas.microsoft.com/office/drawing/2010/main" w="9525">
+                  <a14:hiddenLine xmlns:a14="http://schemas.microsoft.com/office/drawing/2010/main" xmlns="" w="9525">
                     <a:solidFill>
                       <a:srgbClr val="000000"/>
                     </a:solidFill>
@@ -12565,7 +12565,7 @@
               </a:ln>
               <a:extLst>
                 <a:ext uri="{91240B29-F687-4f45-9708-019B960494DF}">
-                  <a14:hiddenLine xmlns="" xmlns:a14="http://schemas.microsoft.com/office/drawing/2010/main" w="9525">
+                  <a14:hiddenLine xmlns:a14="http://schemas.microsoft.com/office/drawing/2010/main" xmlns="" w="9525">
                     <a:solidFill>
                       <a:srgbClr val="000000"/>
                     </a:solidFill>
@@ -12633,7 +12633,7 @@
               </a:ln>
               <a:extLst>
                 <a:ext uri="{91240B29-F687-4f45-9708-019B960494DF}">
-                  <a14:hiddenLine xmlns="" xmlns:a14="http://schemas.microsoft.com/office/drawing/2010/main" w="9525">
+                  <a14:hiddenLine xmlns:a14="http://schemas.microsoft.com/office/drawing/2010/main" xmlns="" w="9525">
                     <a:solidFill>
                       <a:srgbClr val="000000"/>
                     </a:solidFill>
@@ -12723,7 +12723,7 @@
               </a:ln>
               <a:extLst>
                 <a:ext uri="{91240B29-F687-4f45-9708-019B960494DF}">
-                  <a14:hiddenLine xmlns="" xmlns:a14="http://schemas.microsoft.com/office/drawing/2010/main" w="9525">
+                  <a14:hiddenLine xmlns:a14="http://schemas.microsoft.com/office/drawing/2010/main" xmlns="" w="9525">
                     <a:solidFill>
                       <a:srgbClr val="000000"/>
                     </a:solidFill>
@@ -12791,7 +12791,7 @@
               </a:ln>
               <a:extLst>
                 <a:ext uri="{91240B29-F687-4f45-9708-019B960494DF}">
-                  <a14:hiddenLine xmlns="" xmlns:a14="http://schemas.microsoft.com/office/drawing/2010/main" w="9525">
+                  <a14:hiddenLine xmlns:a14="http://schemas.microsoft.com/office/drawing/2010/main" xmlns="" w="9525">
                     <a:solidFill>
                       <a:srgbClr val="000000"/>
                     </a:solidFill>
@@ -12881,7 +12881,7 @@
               </a:ln>
               <a:extLst>
                 <a:ext uri="{91240B29-F687-4f45-9708-019B960494DF}">
-                  <a14:hiddenLine xmlns="" xmlns:a14="http://schemas.microsoft.com/office/drawing/2010/main" w="9525">
+                  <a14:hiddenLine xmlns:a14="http://schemas.microsoft.com/office/drawing/2010/main" xmlns="" w="9525">
                     <a:solidFill>
                       <a:srgbClr val="000000"/>
                     </a:solidFill>
@@ -12915,7 +12915,7 @@
               </a:ln>
               <a:extLst>
                 <a:ext uri="{91240B29-F687-4f45-9708-019B960494DF}">
-                  <a14:hiddenLine xmlns="" xmlns:a14="http://schemas.microsoft.com/office/drawing/2010/main" w="9525">
+                  <a14:hiddenLine xmlns:a14="http://schemas.microsoft.com/office/drawing/2010/main" xmlns="" w="9525">
                     <a:solidFill>
                       <a:srgbClr val="000000"/>
                     </a:solidFill>
@@ -13055,7 +13055,7 @@
           <a:p>
             <a:fld id="{EC4347D3-4C9A-C240-8F14-750059DFEEB0}" type="datetimeFigureOut">
               <a:rPr lang="en-US" smtClean="0"/>
-              <a:t>8/9/23</a:t>
+              <a:t>8/22/23</a:t>
             </a:fld>
             <a:endParaRPr lang="en-US"/>
           </a:p>
@@ -14106,8 +14106,8 @@
           </a:p>
         </p:txBody>
       </p:sp>
-      <mc:AlternateContent xmlns:mc="http://schemas.openxmlformats.org/markup-compatibility/2006">
-        <mc:Choice xmlns:a14="http://schemas.microsoft.com/office/drawing/2010/main" Requires="a14">
+      <mc:AlternateContent xmlns:mc="http://schemas.openxmlformats.org/markup-compatibility/2006" xmlns:a14="http://schemas.microsoft.com/office/drawing/2010/main">
+        <mc:Choice Requires="a14">
           <p:sp>
             <p:nvSpPr>
               <p:cNvPr id="3" name="Content Placeholder 2"/>
@@ -14269,7 +14269,7 @@
                               <a:solidFill>
                                 <a:sysClr val="windowText" lastClr="000000"/>
                               </a:solidFill>
-                              <a:latin typeface="Cambria Math"/>
+                              <a:latin typeface="Cambria Math" panose="02040503050406030204" pitchFamily="18" charset="0"/>
                             </a:rPr>
                           </m:ctrlPr>
                         </m:dPr>
@@ -14335,7 +14335,7 @@
                               <a:solidFill>
                                 <a:sysClr val="windowText" lastClr="000000"/>
                               </a:solidFill>
-                              <a:latin typeface="Cambria Math"/>
+                              <a:latin typeface="Cambria Math" panose="02040503050406030204" pitchFamily="18" charset="0"/>
                             </a:rPr>
                           </m:ctrlPr>
                         </m:dPr>
@@ -14485,7 +14485,7 @@
             </p:txBody>
           </p:sp>
         </mc:Choice>
-        <mc:Fallback>
+        <mc:Fallback xmlns="">
           <p:sp>
             <p:nvSpPr>
               <p:cNvPr id="3" name="Content Placeholder 2"/>
@@ -14988,8 +14988,8 @@
           </a:p>
         </p:txBody>
       </p:sp>
-      <mc:AlternateContent xmlns:mc="http://schemas.openxmlformats.org/markup-compatibility/2006">
-        <mc:Choice xmlns:a14="http://schemas.microsoft.com/office/drawing/2010/main" Requires="a14">
+      <mc:AlternateContent xmlns:mc="http://schemas.openxmlformats.org/markup-compatibility/2006" xmlns:a14="http://schemas.microsoft.com/office/drawing/2010/main">
+        <mc:Choice Requires="a14">
           <p:sp>
             <p:nvSpPr>
               <p:cNvPr id="7" name="Content Placeholder 2">
@@ -15258,7 +15258,7 @@
                               <a:solidFill>
                                 <a:sysClr val="windowText" lastClr="000000"/>
                               </a:solidFill>
-                              <a:latin typeface="Cambria Math"/>
+                              <a:latin typeface="Cambria Math" panose="02040503050406030204" pitchFamily="18" charset="0"/>
                             </a:rPr>
                           </m:ctrlPr>
                         </m:dPr>
@@ -15418,7 +15418,7 @@
             </p:txBody>
           </p:sp>
         </mc:Choice>
-        <mc:Fallback>
+        <mc:Fallback xmlns="">
           <p:sp>
             <p:nvSpPr>
               <p:cNvPr id="7" name="Content Placeholder 2">
@@ -15576,8 +15576,8 @@
           </a:p>
         </p:txBody>
       </p:sp>
-      <mc:AlternateContent xmlns:mc="http://schemas.openxmlformats.org/markup-compatibility/2006">
-        <mc:Choice xmlns:a14="http://schemas.microsoft.com/office/drawing/2010/main" Requires="a14">
+      <mc:AlternateContent xmlns:mc="http://schemas.openxmlformats.org/markup-compatibility/2006" xmlns:a14="http://schemas.microsoft.com/office/drawing/2010/main">
+        <mc:Choice Requires="a14">
           <p:sp>
             <p:nvSpPr>
               <p:cNvPr id="5" name="Content Placeholder 2">
@@ -15820,7 +15820,7 @@
             </p:txBody>
           </p:sp>
         </mc:Choice>
-        <mc:Fallback>
+        <mc:Fallback xmlns="">
           <p:sp>
             <p:nvSpPr>
               <p:cNvPr id="5" name="Content Placeholder 2">
@@ -15865,8 +15865,8 @@
           </p:sp>
         </mc:Fallback>
       </mc:AlternateContent>
-      <mc:AlternateContent xmlns:mc="http://schemas.openxmlformats.org/markup-compatibility/2006">
-        <mc:Choice xmlns:a14="http://schemas.microsoft.com/office/drawing/2010/main" Requires="a14">
+      <mc:AlternateContent xmlns:mc="http://schemas.openxmlformats.org/markup-compatibility/2006" xmlns:a14="http://schemas.microsoft.com/office/drawing/2010/main">
+        <mc:Choice Requires="a14">
           <p:sp>
             <p:nvSpPr>
               <p:cNvPr id="6" name="Content Placeholder 2">
@@ -16595,7 +16595,7 @@
             </p:txBody>
           </p:sp>
         </mc:Choice>
-        <mc:Fallback>
+        <mc:Fallback xmlns="">
           <p:sp>
             <p:nvSpPr>
               <p:cNvPr id="6" name="Content Placeholder 2">
@@ -16640,8 +16640,8 @@
           </p:sp>
         </mc:Fallback>
       </mc:AlternateContent>
-      <mc:AlternateContent xmlns:mc="http://schemas.openxmlformats.org/markup-compatibility/2006">
-        <mc:Choice xmlns:a14="http://schemas.microsoft.com/office/drawing/2010/main" Requires="a14">
+      <mc:AlternateContent xmlns:mc="http://schemas.openxmlformats.org/markup-compatibility/2006" xmlns:a14="http://schemas.microsoft.com/office/drawing/2010/main">
+        <mc:Choice Requires="a14">
           <p:sp>
             <p:nvSpPr>
               <p:cNvPr id="7" name="Content Placeholder 2">
@@ -16956,7 +16956,7 @@
             </p:txBody>
           </p:sp>
         </mc:Choice>
-        <mc:Fallback>
+        <mc:Fallback xmlns="">
           <p:sp>
             <p:nvSpPr>
               <p:cNvPr id="7" name="Content Placeholder 2">
@@ -17719,8 +17719,8 @@
           </a:p>
         </p:txBody>
       </p:sp>
-      <mc:AlternateContent xmlns:mc="http://schemas.openxmlformats.org/markup-compatibility/2006" xmlns:a14="http://schemas.microsoft.com/office/drawing/2010/main">
-        <mc:Choice Requires="a14">
+      <mc:AlternateContent xmlns:mc="http://schemas.openxmlformats.org/markup-compatibility/2006">
+        <mc:Choice xmlns:a14="http://schemas.microsoft.com/office/drawing/2010/main" Requires="a14">
           <p:sp>
             <p:nvSpPr>
               <p:cNvPr id="5" name="Content Placeholder 2">
@@ -17737,7 +17737,7 @@
             </p:nvSpPr>
             <p:spPr>
               <a:xfrm>
-                <a:off x="6214837" y="4736272"/>
+                <a:off x="6558868" y="4962609"/>
                 <a:ext cx="4200539" cy="1382934"/>
               </a:xfrm>
               <a:prstGeom prst="rect">
@@ -18248,7 +18248,7 @@
             </p:txBody>
           </p:sp>
         </mc:Choice>
-        <mc:Fallback xmlns="">
+        <mc:Fallback>
           <p:sp>
             <p:nvSpPr>
               <p:cNvPr id="5" name="Content Placeholder 2">
@@ -18265,7 +18265,7 @@
             </p:nvSpPr>
             <p:spPr>
               <a:xfrm>
-                <a:off x="6214837" y="4736272"/>
+                <a:off x="6558868" y="4962609"/>
                 <a:ext cx="4200539" cy="1382934"/>
               </a:xfrm>
               <a:prstGeom prst="rect">
@@ -18274,7 +18274,7 @@
               <a:blipFill>
                 <a:blip r:embed="rId2"/>
                 <a:stretch>
-                  <a:fillRect l="-904" b="-19091"/>
+                  <a:fillRect l="-1208" b="-19091"/>
                 </a:stretch>
               </a:blipFill>
             </p:spPr>
@@ -18585,8 +18585,8 @@
           </p:sp>
         </mc:Fallback>
       </mc:AlternateContent>
-      <mc:AlternateContent xmlns:mc="http://schemas.openxmlformats.org/markup-compatibility/2006" xmlns:a14="http://schemas.microsoft.com/office/drawing/2010/main">
-        <mc:Choice Requires="a14">
+      <mc:AlternateContent xmlns:mc="http://schemas.openxmlformats.org/markup-compatibility/2006">
+        <mc:Choice xmlns:a14="http://schemas.microsoft.com/office/drawing/2010/main" Requires="a14">
           <p:sp>
             <p:nvSpPr>
               <p:cNvPr id="7" name="Content Placeholder 2">
@@ -18796,14 +18796,6 @@
                 <a:pPr marL="457200" lvl="1" indent="0" algn="ctr">
                   <a:buNone/>
                 </a:pPr>
-                <a:r>
-                  <a:rPr lang="en-US" sz="1800" dirty="0">
-                    <a:solidFill>
-                      <a:schemeClr val="bg1"/>
-                    </a:solidFill>
-                  </a:rPr>
-                  <a:t>The set of 3-bit strings.</a:t>
-                </a:r>
                 <a:br>
                   <a:rPr lang="en-US" sz="1800" dirty="0">
                     <a:solidFill>
@@ -18857,13 +18849,13 @@
                         </m:e>
                         <m:sup>
                           <m:r>
-                            <a:rPr lang="en-US" i="1">
+                            <a:rPr lang="en-US" b="0" i="1" smtClean="0">
                               <a:solidFill>
                                 <a:schemeClr val="bg1"/>
                               </a:solidFill>
-                              <a:latin typeface="Cambria Math"/>
+                              <a:latin typeface="Cambria Math" panose="02040503050406030204" pitchFamily="18" charset="0"/>
                             </a:rPr>
-                            <m:t>3</m:t>
+                            <m:t>∗</m:t>
                           </m:r>
                         </m:sup>
                       </m:sSup>
@@ -19357,7 +19349,7 @@
             </p:txBody>
           </p:sp>
         </mc:Choice>
-        <mc:Fallback xmlns="">
+        <mc:Fallback>
           <p:sp>
             <p:nvSpPr>
               <p:cNvPr id="7" name="Content Placeholder 2">
@@ -19383,7 +19375,7 @@
               <a:blipFill>
                 <a:blip r:embed="rId4"/>
                 <a:stretch>
-                  <a:fillRect t="-1351"/>
+                  <a:fillRect/>
                 </a:stretch>
               </a:blipFill>
             </p:spPr>
@@ -19696,8 +19688,8 @@
           </p:sp>
         </mc:Fallback>
       </mc:AlternateContent>
-      <mc:AlternateContent xmlns:mc="http://schemas.openxmlformats.org/markup-compatibility/2006" xmlns:a14="http://schemas.microsoft.com/office/drawing/2010/main">
-        <mc:Choice Requires="a14">
+      <mc:AlternateContent xmlns:mc="http://schemas.openxmlformats.org/markup-compatibility/2006">
+        <mc:Choice xmlns:a14="http://schemas.microsoft.com/office/drawing/2010/main" Requires="a14">
           <p:sp>
             <p:nvSpPr>
               <p:cNvPr id="9" name="Content Placeholder 2">
@@ -19955,7 +19947,7 @@
             </p:txBody>
           </p:sp>
         </mc:Choice>
-        <mc:Fallback xmlns="">
+        <mc:Fallback>
           <p:sp>
             <p:nvSpPr>
               <p:cNvPr id="9" name="Content Placeholder 2">
@@ -19982,6 +19974,347 @@
                 <a:blip r:embed="rId6"/>
                 <a:stretch>
                   <a:fillRect/>
+                </a:stretch>
+              </a:blipFill>
+            </p:spPr>
+            <p:txBody>
+              <a:bodyPr/>
+              <a:lstStyle/>
+              <a:p>
+                <a:r>
+                  <a:rPr lang="en-US">
+                    <a:noFill/>
+                  </a:rPr>
+                  <a:t> </a:t>
+                </a:r>
+              </a:p>
+            </p:txBody>
+          </p:sp>
+        </mc:Fallback>
+      </mc:AlternateContent>
+      <mc:AlternateContent xmlns:mc="http://schemas.openxmlformats.org/markup-compatibility/2006">
+        <mc:Choice xmlns:a14="http://schemas.microsoft.com/office/drawing/2010/main" Requires="a14">
+          <p:sp>
+            <p:nvSpPr>
+              <p:cNvPr id="10" name="Content Placeholder 2">
+                <a:extLst>
+                  <a:ext uri="{FF2B5EF4-FFF2-40B4-BE49-F238E27FC236}">
+                    <a16:creationId xmlns:a16="http://schemas.microsoft.com/office/drawing/2014/main" id="{E1E4810F-9DA9-474C-9AB7-147D40DDB741}"/>
+                  </a:ext>
+                </a:extLst>
+              </p:cNvPr>
+              <p:cNvSpPr txBox="1">
+                <a:spLocks/>
+              </p:cNvSpPr>
+              <p:nvPr/>
+            </p:nvSpPr>
+            <p:spPr>
+              <a:xfrm>
+                <a:off x="1659435" y="4962609"/>
+                <a:ext cx="4200539" cy="1382934"/>
+              </a:xfrm>
+              <a:prstGeom prst="rect">
+                <a:avLst/>
+              </a:prstGeom>
+            </p:spPr>
+            <p:txBody>
+              <a:bodyPr vert="horz" lIns="91440" tIns="45720" rIns="91440" bIns="45720" rtlCol="0">
+                <a:normAutofit/>
+              </a:bodyPr>
+              <a:lstStyle>
+                <a:lvl1pPr marL="228600" indent="-228600" algn="l" defTabSz="914400" rtl="0" eaLnBrk="1" latinLnBrk="0" hangingPunct="1">
+                  <a:lnSpc>
+                    <a:spcPct val="120000"/>
+                  </a:lnSpc>
+                  <a:spcBef>
+                    <a:spcPts val="1000"/>
+                  </a:spcBef>
+                  <a:buSzPct val="125000"/>
+                  <a:buFont typeface="Arial" panose="020B0604020202020204" pitchFamily="34" charset="0"/>
+                  <a:buChar char="•"/>
+                  <a:defRPr sz="2400" kern="1200">
+                    <a:solidFill>
+                      <a:schemeClr val="tx1"/>
+                    </a:solidFill>
+                    <a:latin typeface="+mn-lt"/>
+                    <a:ea typeface="+mn-ea"/>
+                    <a:cs typeface="+mn-cs"/>
+                  </a:defRPr>
+                </a:lvl1pPr>
+                <a:lvl2pPr marL="685800" indent="-228600" algn="l" defTabSz="914400" rtl="0" eaLnBrk="1" latinLnBrk="0" hangingPunct="1">
+                  <a:lnSpc>
+                    <a:spcPct val="120000"/>
+                  </a:lnSpc>
+                  <a:spcBef>
+                    <a:spcPts val="500"/>
+                  </a:spcBef>
+                  <a:buSzPct val="125000"/>
+                  <a:buFont typeface="Arial" panose="020B0604020202020204" pitchFamily="34" charset="0"/>
+                  <a:buChar char="•"/>
+                  <a:defRPr sz="2000" kern="1200">
+                    <a:solidFill>
+                      <a:schemeClr val="tx1"/>
+                    </a:solidFill>
+                    <a:latin typeface="+mn-lt"/>
+                    <a:ea typeface="+mn-ea"/>
+                    <a:cs typeface="+mn-cs"/>
+                  </a:defRPr>
+                </a:lvl2pPr>
+                <a:lvl3pPr marL="1143000" indent="-228600" algn="l" defTabSz="914400" rtl="0" eaLnBrk="1" latinLnBrk="0" hangingPunct="1">
+                  <a:lnSpc>
+                    <a:spcPct val="120000"/>
+                  </a:lnSpc>
+                  <a:spcBef>
+                    <a:spcPts val="500"/>
+                  </a:spcBef>
+                  <a:buSzPct val="125000"/>
+                  <a:buFont typeface="Arial" panose="020B0604020202020204" pitchFamily="34" charset="0"/>
+                  <a:buChar char="•"/>
+                  <a:defRPr sz="1800" kern="1200">
+                    <a:solidFill>
+                      <a:schemeClr val="tx1"/>
+                    </a:solidFill>
+                    <a:latin typeface="+mn-lt"/>
+                    <a:ea typeface="+mn-ea"/>
+                    <a:cs typeface="+mn-cs"/>
+                  </a:defRPr>
+                </a:lvl3pPr>
+                <a:lvl4pPr marL="1600200" indent="-228600" algn="l" defTabSz="914400" rtl="0" eaLnBrk="1" latinLnBrk="0" hangingPunct="1">
+                  <a:lnSpc>
+                    <a:spcPct val="120000"/>
+                  </a:lnSpc>
+                  <a:spcBef>
+                    <a:spcPts val="500"/>
+                  </a:spcBef>
+                  <a:buSzPct val="125000"/>
+                  <a:buFont typeface="Arial" panose="020B0604020202020204" pitchFamily="34" charset="0"/>
+                  <a:buChar char="•"/>
+                  <a:defRPr sz="1600" kern="1200">
+                    <a:solidFill>
+                      <a:schemeClr val="tx1"/>
+                    </a:solidFill>
+                    <a:latin typeface="+mn-lt"/>
+                    <a:ea typeface="+mn-ea"/>
+                    <a:cs typeface="+mn-cs"/>
+                  </a:defRPr>
+                </a:lvl4pPr>
+                <a:lvl5pPr marL="2057400" indent="-228600" algn="l" defTabSz="914400" rtl="0" eaLnBrk="1" latinLnBrk="0" hangingPunct="1">
+                  <a:lnSpc>
+                    <a:spcPct val="120000"/>
+                  </a:lnSpc>
+                  <a:spcBef>
+                    <a:spcPts val="500"/>
+                  </a:spcBef>
+                  <a:buSzPct val="125000"/>
+                  <a:buFont typeface="Arial" panose="020B0604020202020204" pitchFamily="34" charset="0"/>
+                  <a:buChar char="•"/>
+                  <a:defRPr sz="1600" kern="1200">
+                    <a:solidFill>
+                      <a:schemeClr val="tx1"/>
+                    </a:solidFill>
+                    <a:latin typeface="+mn-lt"/>
+                    <a:ea typeface="+mn-ea"/>
+                    <a:cs typeface="+mn-cs"/>
+                  </a:defRPr>
+                </a:lvl5pPr>
+                <a:lvl6pPr marL="2514600" indent="-228600" algn="l" defTabSz="914400" rtl="0" eaLnBrk="1" latinLnBrk="0" hangingPunct="1">
+                  <a:lnSpc>
+                    <a:spcPct val="120000"/>
+                  </a:lnSpc>
+                  <a:spcBef>
+                    <a:spcPts val="500"/>
+                  </a:spcBef>
+                  <a:buSzPct val="125000"/>
+                  <a:buFont typeface="Arial" panose="020B0604020202020204" pitchFamily="34" charset="0"/>
+                  <a:buChar char="•"/>
+                  <a:defRPr sz="1400" kern="1200">
+                    <a:solidFill>
+                      <a:schemeClr val="tx1"/>
+                    </a:solidFill>
+                    <a:latin typeface="+mn-lt"/>
+                    <a:ea typeface="+mn-ea"/>
+                    <a:cs typeface="+mn-cs"/>
+                  </a:defRPr>
+                </a:lvl6pPr>
+                <a:lvl7pPr marL="2971800" indent="-228600" algn="l" defTabSz="914400" rtl="0" eaLnBrk="1" latinLnBrk="0" hangingPunct="1">
+                  <a:lnSpc>
+                    <a:spcPct val="120000"/>
+                  </a:lnSpc>
+                  <a:spcBef>
+                    <a:spcPts val="500"/>
+                  </a:spcBef>
+                  <a:buSzPct val="125000"/>
+                  <a:buFont typeface="Arial" panose="020B0604020202020204" pitchFamily="34" charset="0"/>
+                  <a:buChar char="•"/>
+                  <a:defRPr sz="1400" kern="1200">
+                    <a:solidFill>
+                      <a:schemeClr val="tx1"/>
+                    </a:solidFill>
+                    <a:latin typeface="+mn-lt"/>
+                    <a:ea typeface="+mn-ea"/>
+                    <a:cs typeface="+mn-cs"/>
+                  </a:defRPr>
+                </a:lvl7pPr>
+                <a:lvl8pPr marL="3429000" indent="-228600" algn="l" defTabSz="914400" rtl="0" eaLnBrk="1" latinLnBrk="0" hangingPunct="1">
+                  <a:lnSpc>
+                    <a:spcPct val="120000"/>
+                  </a:lnSpc>
+                  <a:spcBef>
+                    <a:spcPts val="500"/>
+                  </a:spcBef>
+                  <a:buSzPct val="125000"/>
+                  <a:buFont typeface="Arial" panose="020B0604020202020204" pitchFamily="34" charset="0"/>
+                  <a:buChar char="•"/>
+                  <a:defRPr sz="1400" kern="1200">
+                    <a:solidFill>
+                      <a:schemeClr val="tx1"/>
+                    </a:solidFill>
+                    <a:latin typeface="+mn-lt"/>
+                    <a:ea typeface="+mn-ea"/>
+                    <a:cs typeface="+mn-cs"/>
+                  </a:defRPr>
+                </a:lvl8pPr>
+                <a:lvl9pPr marL="3886200" indent="-228600" algn="l" defTabSz="914400" rtl="0" eaLnBrk="1" latinLnBrk="0" hangingPunct="1">
+                  <a:lnSpc>
+                    <a:spcPct val="120000"/>
+                  </a:lnSpc>
+                  <a:spcBef>
+                    <a:spcPts val="500"/>
+                  </a:spcBef>
+                  <a:buSzPct val="125000"/>
+                  <a:buFont typeface="Arial" panose="020B0604020202020204" pitchFamily="34" charset="0"/>
+                  <a:buChar char="•"/>
+                  <a:defRPr sz="1400" kern="1200">
+                    <a:solidFill>
+                      <a:schemeClr val="tx1"/>
+                    </a:solidFill>
+                    <a:latin typeface="+mn-lt"/>
+                    <a:ea typeface="+mn-ea"/>
+                    <a:cs typeface="+mn-cs"/>
+                  </a:defRPr>
+                </a:lvl9pPr>
+              </a:lstStyle>
+              <a:p>
+                <a:pPr marL="0" indent="0">
+                  <a:buNone/>
+                </a:pPr>
+                <a:r>
+                  <a:rPr lang="en-US" sz="1600" i="1" dirty="0">
+                    <a:latin typeface="Cambria Math" panose="02040503050406030204" pitchFamily="18" charset="0"/>
+                  </a:rPr>
+                  <a:t>Note that:</a:t>
+                </a:r>
+              </a:p>
+              <a:p>
+                <a14:m>
+                  <m:oMath xmlns:m="http://schemas.openxmlformats.org/officeDocument/2006/math">
+                    <m:sSup>
+                      <m:sSupPr>
+                        <m:ctrlPr>
+                          <a:rPr lang="en-US" sz="1600" i="1" smtClean="0">
+                            <a:latin typeface="Cambria Math" panose="02040503050406030204" pitchFamily="18" charset="0"/>
+                          </a:rPr>
+                        </m:ctrlPr>
+                      </m:sSupPr>
+                      <m:e>
+                        <m:d>
+                          <m:dPr>
+                            <m:begChr m:val="{"/>
+                            <m:endChr m:val="}"/>
+                            <m:ctrlPr>
+                              <a:rPr lang="en-US" sz="1600" i="1" smtClean="0">
+                                <a:latin typeface="Cambria Math" panose="02040503050406030204" pitchFamily="18" charset="0"/>
+                              </a:rPr>
+                            </m:ctrlPr>
+                          </m:dPr>
+                          <m:e>
+                            <m:r>
+                              <a:rPr lang="en-US" sz="1600" i="1" smtClean="0">
+                                <a:latin typeface="Cambria Math"/>
+                              </a:rPr>
+                              <m:t>0,1</m:t>
+                            </m:r>
+                          </m:e>
+                        </m:d>
+                      </m:e>
+                      <m:sup>
+                        <m:r>
+                          <a:rPr lang="en-US" sz="1600" b="0" i="1" smtClean="0">
+                            <a:latin typeface="Cambria Math" panose="02040503050406030204" pitchFamily="18" charset="0"/>
+                          </a:rPr>
+                          <m:t>3</m:t>
+                        </m:r>
+                      </m:sup>
+                    </m:sSup>
+                    <m:r>
+                      <a:rPr lang="en-US" sz="1600" i="1" smtClean="0">
+                        <a:latin typeface="Cambria Math"/>
+                      </a:rPr>
+                      <m:t>=</m:t>
+                    </m:r>
+                    <m:d>
+                      <m:dPr>
+                        <m:begChr m:val="{"/>
+                        <m:endChr m:val="}"/>
+                        <m:ctrlPr>
+                          <a:rPr lang="en-US" sz="1600" b="0" i="1" smtClean="0">
+                            <a:latin typeface="Cambria Math" panose="02040503050406030204" pitchFamily="18" charset="0"/>
+                          </a:rPr>
+                        </m:ctrlPr>
+                      </m:dPr>
+                      <m:e>
+                        <m:r>
+                          <a:rPr lang="en-US" sz="1600" b="0" i="1" smtClean="0">
+                            <a:latin typeface="Cambria Math" panose="02040503050406030204" pitchFamily="18" charset="0"/>
+                          </a:rPr>
+                          <m:t>000, 001, 010, 011,…</m:t>
+                        </m:r>
+                      </m:e>
+                    </m:d>
+                  </m:oMath>
+                </a14:m>
+                <a:endParaRPr lang="en-US" sz="1600" b="0" i="1" dirty="0">
+                  <a:latin typeface="Cambria Math"/>
+                </a:endParaRPr>
+              </a:p>
+              <a:p>
+                <a:r>
+                  <a:rPr lang="en-US" sz="1600" i="1" dirty="0">
+                    <a:latin typeface="Cambria Math"/>
+                  </a:rPr>
+                  <a:t>The set of three-bit strings</a:t>
+                </a:r>
+              </a:p>
+            </p:txBody>
+          </p:sp>
+        </mc:Choice>
+        <mc:Fallback>
+          <p:sp>
+            <p:nvSpPr>
+              <p:cNvPr id="10" name="Content Placeholder 2">
+                <a:extLst>
+                  <a:ext uri="{FF2B5EF4-FFF2-40B4-BE49-F238E27FC236}">
+                    <a16:creationId xmlns:a16="http://schemas.microsoft.com/office/drawing/2014/main" id="{E1E4810F-9DA9-474C-9AB7-147D40DDB741}"/>
+                  </a:ext>
+                </a:extLst>
+              </p:cNvPr>
+              <p:cNvSpPr txBox="1">
+                <a:spLocks noRot="1" noChangeAspect="1" noMove="1" noResize="1" noEditPoints="1" noAdjustHandles="1" noChangeArrowheads="1" noChangeShapeType="1" noTextEdit="1"/>
+              </p:cNvSpPr>
+              <p:nvPr/>
+            </p:nvSpPr>
+            <p:spPr>
+              <a:xfrm>
+                <a:off x="1659435" y="4962609"/>
+                <a:ext cx="4200539" cy="1382934"/>
+              </a:xfrm>
+              <a:prstGeom prst="rect">
+                <a:avLst/>
+              </a:prstGeom>
+              <a:blipFill>
+                <a:blip r:embed="rId7"/>
+                <a:stretch>
+                  <a:fillRect l="-1208"/>
                 </a:stretch>
               </a:blipFill>
             </p:spPr>
@@ -24985,8 +25318,8 @@
           </a:p>
         </p:txBody>
       </p:sp>
-      <mc:AlternateContent xmlns:mc="http://schemas.openxmlformats.org/markup-compatibility/2006">
-        <mc:Choice xmlns:a14="http://schemas.microsoft.com/office/drawing/2010/main" Requires="a14">
+      <mc:AlternateContent xmlns:mc="http://schemas.openxmlformats.org/markup-compatibility/2006" xmlns:a14="http://schemas.microsoft.com/office/drawing/2010/main">
+        <mc:Choice Requires="a14">
           <p:sp>
             <p:nvSpPr>
               <p:cNvPr id="3" name="Content Placeholder 2"/>
@@ -25144,7 +25477,7 @@
             </p:txBody>
           </p:sp>
         </mc:Choice>
-        <mc:Fallback>
+        <mc:Fallback xmlns="">
           <p:sp>
             <p:nvSpPr>
               <p:cNvPr id="3" name="Content Placeholder 2"/>
@@ -25205,8 +25538,8 @@
           </a:p>
         </p:txBody>
       </p:sp>
-      <mc:AlternateContent xmlns:mc="http://schemas.openxmlformats.org/markup-compatibility/2006">
-        <mc:Choice xmlns:a14="http://schemas.microsoft.com/office/drawing/2010/main" Requires="a14">
+      <mc:AlternateContent xmlns:mc="http://schemas.openxmlformats.org/markup-compatibility/2006" xmlns:a14="http://schemas.microsoft.com/office/drawing/2010/main">
+        <mc:Choice Requires="a14">
           <p:sp>
             <p:nvSpPr>
               <p:cNvPr id="5" name="Content Placeholder 2">
@@ -25635,7 +25968,7 @@
             </p:txBody>
           </p:sp>
         </mc:Choice>
-        <mc:Fallback>
+        <mc:Fallback xmlns="">
           <p:sp>
             <p:nvSpPr>
               <p:cNvPr id="5" name="Content Placeholder 2">

</xml_diff>

<commit_message>
adding a pdf slide deck
</commit_message>
<xml_diff>
--- a/slides/01-WhatIsAComputer.pptx
+++ b/slides/01-WhatIsAComputer.pptx
@@ -234,7 +234,7 @@
           <a:p>
             <a:fld id="{C5B45307-6ED4-B142-BD64-10F739779302}" type="datetimeFigureOut">
               <a:rPr lang="en-US" smtClean="0"/>
-              <a:t>8/25/25</a:t>
+              <a:t>9/2/25</a:t>
             </a:fld>
             <a:endParaRPr lang="en-US"/>
           </a:p>
@@ -1197,7 +1197,7 @@
           <a:noFill/>
           <a:extLst>
             <a:ext uri="{909E8E84-426E-40dd-AFC4-6F175D3DCCD1}">
-              <a14:hiddenFill xmlns:a14="http://schemas.microsoft.com/office/drawing/2010/main" xmlns="">
+              <a14:hiddenFill xmlns="" xmlns:a14="http://schemas.microsoft.com/office/drawing/2010/main">
                 <a:solidFill>
                   <a:srgbClr val="FFFFFF"/>
                 </a:solidFill>
@@ -1256,7 +1256,7 @@
             </a:ln>
             <a:extLst>
               <a:ext uri="{91240B29-F687-4f45-9708-019B960494DF}">
-                <a14:hiddenLine xmlns:a14="http://schemas.microsoft.com/office/drawing/2010/main" xmlns="" w="9525">
+                <a14:hiddenLine xmlns="" xmlns:a14="http://schemas.microsoft.com/office/drawing/2010/main" w="9525">
                   <a:solidFill>
                     <a:srgbClr val="000000"/>
                   </a:solidFill>
@@ -1346,7 +1346,7 @@
             </a:ln>
             <a:extLst>
               <a:ext uri="{91240B29-F687-4f45-9708-019B960494DF}">
-                <a14:hiddenLine xmlns:a14="http://schemas.microsoft.com/office/drawing/2010/main" xmlns="" w="9525">
+                <a14:hiddenLine xmlns="" xmlns:a14="http://schemas.microsoft.com/office/drawing/2010/main" w="9525">
                   <a:solidFill>
                     <a:srgbClr val="000000"/>
                   </a:solidFill>
@@ -1436,7 +1436,7 @@
             </a:ln>
             <a:extLst>
               <a:ext uri="{91240B29-F687-4f45-9708-019B960494DF}">
-                <a14:hiddenLine xmlns:a14="http://schemas.microsoft.com/office/drawing/2010/main" xmlns="" w="9525">
+                <a14:hiddenLine xmlns="" xmlns:a14="http://schemas.microsoft.com/office/drawing/2010/main" w="9525">
                   <a:solidFill>
                     <a:srgbClr val="000000"/>
                   </a:solidFill>
@@ -1470,7 +1470,7 @@
             </a:ln>
             <a:extLst>
               <a:ext uri="{91240B29-F687-4f45-9708-019B960494DF}">
-                <a14:hiddenLine xmlns:a14="http://schemas.microsoft.com/office/drawing/2010/main" xmlns="" w="9525">
+                <a14:hiddenLine xmlns="" xmlns:a14="http://schemas.microsoft.com/office/drawing/2010/main" w="9525">
                   <a:solidFill>
                     <a:srgbClr val="000000"/>
                   </a:solidFill>
@@ -1560,7 +1560,7 @@
             </a:ln>
             <a:extLst>
               <a:ext uri="{91240B29-F687-4f45-9708-019B960494DF}">
-                <a14:hiddenLine xmlns:a14="http://schemas.microsoft.com/office/drawing/2010/main" xmlns="" w="9525">
+                <a14:hiddenLine xmlns="" xmlns:a14="http://schemas.microsoft.com/office/drawing/2010/main" w="9525">
                   <a:solidFill>
                     <a:srgbClr val="000000"/>
                   </a:solidFill>
@@ -1622,7 +1622,7 @@
             </a:ln>
             <a:extLst>
               <a:ext uri="{91240B29-F687-4f45-9708-019B960494DF}">
-                <a14:hiddenLine xmlns:a14="http://schemas.microsoft.com/office/drawing/2010/main" xmlns="" w="9525">
+                <a14:hiddenLine xmlns="" xmlns:a14="http://schemas.microsoft.com/office/drawing/2010/main" w="9525">
                   <a:solidFill>
                     <a:srgbClr val="000000"/>
                   </a:solidFill>
@@ -1684,7 +1684,7 @@
             </a:ln>
             <a:extLst>
               <a:ext uri="{91240B29-F687-4f45-9708-019B960494DF}">
-                <a14:hiddenLine xmlns:a14="http://schemas.microsoft.com/office/drawing/2010/main" xmlns="" w="9525">
+                <a14:hiddenLine xmlns="" xmlns:a14="http://schemas.microsoft.com/office/drawing/2010/main" w="9525">
                   <a:solidFill>
                     <a:srgbClr val="000000"/>
                   </a:solidFill>
@@ -1774,7 +1774,7 @@
             </a:ln>
             <a:extLst>
               <a:ext uri="{91240B29-F687-4f45-9708-019B960494DF}">
-                <a14:hiddenLine xmlns:a14="http://schemas.microsoft.com/office/drawing/2010/main" xmlns="" w="9525">
+                <a14:hiddenLine xmlns="" xmlns:a14="http://schemas.microsoft.com/office/drawing/2010/main" w="9525">
                   <a:solidFill>
                     <a:srgbClr val="000000"/>
                   </a:solidFill>
@@ -1836,7 +1836,7 @@
             </a:ln>
             <a:extLst>
               <a:ext uri="{91240B29-F687-4f45-9708-019B960494DF}">
-                <a14:hiddenLine xmlns:a14="http://schemas.microsoft.com/office/drawing/2010/main" xmlns="" w="9525">
+                <a14:hiddenLine xmlns="" xmlns:a14="http://schemas.microsoft.com/office/drawing/2010/main" w="9525">
                   <a:solidFill>
                     <a:srgbClr val="000000"/>
                   </a:solidFill>
@@ -1898,7 +1898,7 @@
             </a:ln>
             <a:extLst>
               <a:ext uri="{91240B29-F687-4f45-9708-019B960494DF}">
-                <a14:hiddenLine xmlns:a14="http://schemas.microsoft.com/office/drawing/2010/main" xmlns="" w="9525">
+                <a14:hiddenLine xmlns="" xmlns:a14="http://schemas.microsoft.com/office/drawing/2010/main" w="9525">
                   <a:solidFill>
                     <a:srgbClr val="000000"/>
                   </a:solidFill>
@@ -1988,7 +1988,7 @@
             </a:ln>
             <a:extLst>
               <a:ext uri="{91240B29-F687-4f45-9708-019B960494DF}">
-                <a14:hiddenLine xmlns:a14="http://schemas.microsoft.com/office/drawing/2010/main" xmlns="" w="9525">
+                <a14:hiddenLine xmlns="" xmlns:a14="http://schemas.microsoft.com/office/drawing/2010/main" w="9525">
                   <a:solidFill>
                     <a:srgbClr val="000000"/>
                   </a:solidFill>
@@ -2078,7 +2078,7 @@
             </a:ln>
             <a:extLst>
               <a:ext uri="{91240B29-F687-4f45-9708-019B960494DF}">
-                <a14:hiddenLine xmlns:a14="http://schemas.microsoft.com/office/drawing/2010/main" xmlns="" w="9525">
+                <a14:hiddenLine xmlns="" xmlns:a14="http://schemas.microsoft.com/office/drawing/2010/main" w="9525">
                   <a:solidFill>
                     <a:srgbClr val="000000"/>
                   </a:solidFill>
@@ -2140,7 +2140,7 @@
             </a:ln>
             <a:extLst>
               <a:ext uri="{91240B29-F687-4f45-9708-019B960494DF}">
-                <a14:hiddenLine xmlns:a14="http://schemas.microsoft.com/office/drawing/2010/main" xmlns="" w="9525">
+                <a14:hiddenLine xmlns="" xmlns:a14="http://schemas.microsoft.com/office/drawing/2010/main" w="9525">
                   <a:solidFill>
                     <a:srgbClr val="000000"/>
                   </a:solidFill>
@@ -2250,7 +2250,7 @@
             </a:ln>
             <a:extLst>
               <a:ext uri="{91240B29-F687-4f45-9708-019B960494DF}">
-                <a14:hiddenLine xmlns:a14="http://schemas.microsoft.com/office/drawing/2010/main" xmlns="" w="9525">
+                <a14:hiddenLine xmlns="" xmlns:a14="http://schemas.microsoft.com/office/drawing/2010/main" w="9525">
                   <a:solidFill>
                     <a:srgbClr val="000000"/>
                   </a:solidFill>
@@ -2312,7 +2312,7 @@
             </a:ln>
             <a:extLst>
               <a:ext uri="{91240B29-F687-4f45-9708-019B960494DF}">
-                <a14:hiddenLine xmlns:a14="http://schemas.microsoft.com/office/drawing/2010/main" xmlns="" w="9525">
+                <a14:hiddenLine xmlns="" xmlns:a14="http://schemas.microsoft.com/office/drawing/2010/main" w="9525">
                   <a:solidFill>
                     <a:srgbClr val="000000"/>
                   </a:solidFill>
@@ -2402,7 +2402,7 @@
             </a:ln>
             <a:extLst>
               <a:ext uri="{91240B29-F687-4f45-9708-019B960494DF}">
-                <a14:hiddenLine xmlns:a14="http://schemas.microsoft.com/office/drawing/2010/main" xmlns="" w="9525">
+                <a14:hiddenLine xmlns="" xmlns:a14="http://schemas.microsoft.com/office/drawing/2010/main" w="9525">
                   <a:solidFill>
                     <a:srgbClr val="000000"/>
                   </a:solidFill>
@@ -2492,7 +2492,7 @@
             </a:ln>
             <a:extLst>
               <a:ext uri="{91240B29-F687-4f45-9708-019B960494DF}">
-                <a14:hiddenLine xmlns:a14="http://schemas.microsoft.com/office/drawing/2010/main" xmlns="" w="9525">
+                <a14:hiddenLine xmlns="" xmlns:a14="http://schemas.microsoft.com/office/drawing/2010/main" w="9525">
                   <a:solidFill>
                     <a:srgbClr val="000000"/>
                   </a:solidFill>
@@ -2554,7 +2554,7 @@
             </a:ln>
             <a:extLst>
               <a:ext uri="{91240B29-F687-4f45-9708-019B960494DF}">
-                <a14:hiddenLine xmlns:a14="http://schemas.microsoft.com/office/drawing/2010/main" xmlns="" w="9525">
+                <a14:hiddenLine xmlns="" xmlns:a14="http://schemas.microsoft.com/office/drawing/2010/main" w="9525">
                   <a:solidFill>
                     <a:srgbClr val="000000"/>
                   </a:solidFill>
@@ -2644,7 +2644,7 @@
             </a:ln>
             <a:extLst>
               <a:ext uri="{91240B29-F687-4f45-9708-019B960494DF}">
-                <a14:hiddenLine xmlns:a14="http://schemas.microsoft.com/office/drawing/2010/main" xmlns="" w="9525">
+                <a14:hiddenLine xmlns="" xmlns:a14="http://schemas.microsoft.com/office/drawing/2010/main" w="9525">
                   <a:solidFill>
                     <a:srgbClr val="000000"/>
                   </a:solidFill>
@@ -2734,7 +2734,7 @@
             </a:ln>
             <a:extLst>
               <a:ext uri="{91240B29-F687-4f45-9708-019B960494DF}">
-                <a14:hiddenLine xmlns:a14="http://schemas.microsoft.com/office/drawing/2010/main" xmlns="" w="9525">
+                <a14:hiddenLine xmlns="" xmlns:a14="http://schemas.microsoft.com/office/drawing/2010/main" w="9525">
                   <a:solidFill>
                     <a:srgbClr val="000000"/>
                   </a:solidFill>
@@ -2790,7 +2790,7 @@
             </a:ln>
             <a:extLst>
               <a:ext uri="{91240B29-F687-4f45-9708-019B960494DF}">
-                <a14:hiddenLine xmlns:a14="http://schemas.microsoft.com/office/drawing/2010/main" xmlns="" w="9525">
+                <a14:hiddenLine xmlns="" xmlns:a14="http://schemas.microsoft.com/office/drawing/2010/main" w="9525">
                   <a:solidFill>
                     <a:srgbClr val="000000"/>
                   </a:solidFill>
@@ -2880,7 +2880,7 @@
             </a:ln>
             <a:extLst>
               <a:ext uri="{91240B29-F687-4f45-9708-019B960494DF}">
-                <a14:hiddenLine xmlns:a14="http://schemas.microsoft.com/office/drawing/2010/main" xmlns="" w="9525">
+                <a14:hiddenLine xmlns="" xmlns:a14="http://schemas.microsoft.com/office/drawing/2010/main" w="9525">
                   <a:solidFill>
                     <a:srgbClr val="000000"/>
                   </a:solidFill>
@@ -2936,7 +2936,7 @@
             </a:ln>
             <a:extLst>
               <a:ext uri="{91240B29-F687-4f45-9708-019B960494DF}">
-                <a14:hiddenLine xmlns:a14="http://schemas.microsoft.com/office/drawing/2010/main" xmlns="" w="9525">
+                <a14:hiddenLine xmlns="" xmlns:a14="http://schemas.microsoft.com/office/drawing/2010/main" w="9525">
                   <a:solidFill>
                     <a:srgbClr val="000000"/>
                   </a:solidFill>
@@ -3026,7 +3026,7 @@
             </a:ln>
             <a:extLst>
               <a:ext uri="{91240B29-F687-4f45-9708-019B960494DF}">
-                <a14:hiddenLine xmlns:a14="http://schemas.microsoft.com/office/drawing/2010/main" xmlns="" w="9525">
+                <a14:hiddenLine xmlns="" xmlns:a14="http://schemas.microsoft.com/office/drawing/2010/main" w="9525">
                   <a:solidFill>
                     <a:srgbClr val="000000"/>
                   </a:solidFill>
@@ -3094,7 +3094,7 @@
             </a:ln>
             <a:extLst>
               <a:ext uri="{91240B29-F687-4f45-9708-019B960494DF}">
-                <a14:hiddenLine xmlns:a14="http://schemas.microsoft.com/office/drawing/2010/main" xmlns="" w="9525">
+                <a14:hiddenLine xmlns="" xmlns:a14="http://schemas.microsoft.com/office/drawing/2010/main" w="9525">
                   <a:solidFill>
                     <a:srgbClr val="000000"/>
                   </a:solidFill>
@@ -3184,7 +3184,7 @@
             </a:ln>
             <a:extLst>
               <a:ext uri="{91240B29-F687-4f45-9708-019B960494DF}">
-                <a14:hiddenLine xmlns:a14="http://schemas.microsoft.com/office/drawing/2010/main" xmlns="" w="9525">
+                <a14:hiddenLine xmlns="" xmlns:a14="http://schemas.microsoft.com/office/drawing/2010/main" w="9525">
                   <a:solidFill>
                     <a:srgbClr val="000000"/>
                   </a:solidFill>
@@ -3252,7 +3252,7 @@
             </a:ln>
             <a:extLst>
               <a:ext uri="{91240B29-F687-4f45-9708-019B960494DF}">
-                <a14:hiddenLine xmlns:a14="http://schemas.microsoft.com/office/drawing/2010/main" xmlns="" w="9525">
+                <a14:hiddenLine xmlns="" xmlns:a14="http://schemas.microsoft.com/office/drawing/2010/main" w="9525">
                   <a:solidFill>
                     <a:srgbClr val="000000"/>
                   </a:solidFill>
@@ -3342,7 +3342,7 @@
             </a:ln>
             <a:extLst>
               <a:ext uri="{91240B29-F687-4f45-9708-019B960494DF}">
-                <a14:hiddenLine xmlns:a14="http://schemas.microsoft.com/office/drawing/2010/main" xmlns="" w="9525">
+                <a14:hiddenLine xmlns="" xmlns:a14="http://schemas.microsoft.com/office/drawing/2010/main" w="9525">
                   <a:solidFill>
                     <a:srgbClr val="000000"/>
                   </a:solidFill>
@@ -3376,7 +3376,7 @@
             </a:ln>
             <a:extLst>
               <a:ext uri="{91240B29-F687-4f45-9708-019B960494DF}">
-                <a14:hiddenLine xmlns:a14="http://schemas.microsoft.com/office/drawing/2010/main" xmlns="" w="9525">
+                <a14:hiddenLine xmlns="" xmlns:a14="http://schemas.microsoft.com/office/drawing/2010/main" w="9525">
                   <a:solidFill>
                     <a:srgbClr val="000000"/>
                   </a:solidFill>
@@ -3466,7 +3466,7 @@
             </a:ln>
             <a:extLst>
               <a:ext uri="{91240B29-F687-4f45-9708-019B960494DF}">
-                <a14:hiddenLine xmlns:a14="http://schemas.microsoft.com/office/drawing/2010/main" xmlns="" w="9525">
+                <a14:hiddenLine xmlns="" xmlns:a14="http://schemas.microsoft.com/office/drawing/2010/main" w="9525">
                   <a:solidFill>
                     <a:srgbClr val="000000"/>
                   </a:solidFill>
@@ -3528,7 +3528,7 @@
             </a:ln>
             <a:extLst>
               <a:ext uri="{91240B29-F687-4f45-9708-019B960494DF}">
-                <a14:hiddenLine xmlns:a14="http://schemas.microsoft.com/office/drawing/2010/main" xmlns="" w="9525">
+                <a14:hiddenLine xmlns="" xmlns:a14="http://schemas.microsoft.com/office/drawing/2010/main" w="9525">
                   <a:solidFill>
                     <a:srgbClr val="000000"/>
                   </a:solidFill>
@@ -3590,7 +3590,7 @@
             </a:ln>
             <a:extLst>
               <a:ext uri="{91240B29-F687-4f45-9708-019B960494DF}">
-                <a14:hiddenLine xmlns:a14="http://schemas.microsoft.com/office/drawing/2010/main" xmlns="" w="9525">
+                <a14:hiddenLine xmlns="" xmlns:a14="http://schemas.microsoft.com/office/drawing/2010/main" w="9525">
                   <a:solidFill>
                     <a:srgbClr val="000000"/>
                   </a:solidFill>
@@ -3680,7 +3680,7 @@
             </a:ln>
             <a:extLst>
               <a:ext uri="{91240B29-F687-4f45-9708-019B960494DF}">
-                <a14:hiddenLine xmlns:a14="http://schemas.microsoft.com/office/drawing/2010/main" xmlns="" w="9525">
+                <a14:hiddenLine xmlns="" xmlns:a14="http://schemas.microsoft.com/office/drawing/2010/main" w="9525">
                   <a:solidFill>
                     <a:srgbClr val="000000"/>
                   </a:solidFill>
@@ -3748,7 +3748,7 @@
             </a:ln>
             <a:extLst>
               <a:ext uri="{91240B29-F687-4f45-9708-019B960494DF}">
-                <a14:hiddenLine xmlns:a14="http://schemas.microsoft.com/office/drawing/2010/main" xmlns="" w="9525">
+                <a14:hiddenLine xmlns="" xmlns:a14="http://schemas.microsoft.com/office/drawing/2010/main" w="9525">
                   <a:solidFill>
                     <a:srgbClr val="000000"/>
                   </a:solidFill>
@@ -3810,7 +3810,7 @@
             </a:ln>
             <a:extLst>
               <a:ext uri="{91240B29-F687-4f45-9708-019B960494DF}">
-                <a14:hiddenLine xmlns:a14="http://schemas.microsoft.com/office/drawing/2010/main" xmlns="" w="9525">
+                <a14:hiddenLine xmlns="" xmlns:a14="http://schemas.microsoft.com/office/drawing/2010/main" w="9525">
                   <a:solidFill>
                     <a:srgbClr val="000000"/>
                   </a:solidFill>
@@ -3900,7 +3900,7 @@
             </a:ln>
             <a:extLst>
               <a:ext uri="{91240B29-F687-4f45-9708-019B960494DF}">
-                <a14:hiddenLine xmlns:a14="http://schemas.microsoft.com/office/drawing/2010/main" xmlns="" w="9525">
+                <a14:hiddenLine xmlns="" xmlns:a14="http://schemas.microsoft.com/office/drawing/2010/main" w="9525">
                   <a:solidFill>
                     <a:srgbClr val="000000"/>
                   </a:solidFill>
@@ -3962,7 +3962,7 @@
             </a:ln>
             <a:extLst>
               <a:ext uri="{91240B29-F687-4f45-9708-019B960494DF}">
-                <a14:hiddenLine xmlns:a14="http://schemas.microsoft.com/office/drawing/2010/main" xmlns="" w="9525">
+                <a14:hiddenLine xmlns="" xmlns:a14="http://schemas.microsoft.com/office/drawing/2010/main" w="9525">
                   <a:solidFill>
                     <a:srgbClr val="000000"/>
                   </a:solidFill>
@@ -4052,7 +4052,7 @@
             </a:ln>
             <a:extLst>
               <a:ext uri="{91240B29-F687-4f45-9708-019B960494DF}">
-                <a14:hiddenLine xmlns:a14="http://schemas.microsoft.com/office/drawing/2010/main" xmlns="" w="9525">
+                <a14:hiddenLine xmlns="" xmlns:a14="http://schemas.microsoft.com/office/drawing/2010/main" w="9525">
                   <a:solidFill>
                     <a:srgbClr val="000000"/>
                   </a:solidFill>
@@ -4114,7 +4114,7 @@
             </a:ln>
             <a:extLst>
               <a:ext uri="{91240B29-F687-4f45-9708-019B960494DF}">
-                <a14:hiddenLine xmlns:a14="http://schemas.microsoft.com/office/drawing/2010/main" xmlns="" w="9525">
+                <a14:hiddenLine xmlns="" xmlns:a14="http://schemas.microsoft.com/office/drawing/2010/main" w="9525">
                   <a:solidFill>
                     <a:srgbClr val="000000"/>
                   </a:solidFill>
@@ -4204,7 +4204,7 @@
             </a:ln>
             <a:extLst>
               <a:ext uri="{91240B29-F687-4f45-9708-019B960494DF}">
-                <a14:hiddenLine xmlns:a14="http://schemas.microsoft.com/office/drawing/2010/main" xmlns="" w="9525">
+                <a14:hiddenLine xmlns="" xmlns:a14="http://schemas.microsoft.com/office/drawing/2010/main" w="9525">
                   <a:solidFill>
                     <a:srgbClr val="000000"/>
                   </a:solidFill>
@@ -4238,7 +4238,7 @@
             </a:ln>
             <a:extLst>
               <a:ext uri="{91240B29-F687-4f45-9708-019B960494DF}">
-                <a14:hiddenLine xmlns:a14="http://schemas.microsoft.com/office/drawing/2010/main" xmlns="" w="9525">
+                <a14:hiddenLine xmlns="" xmlns:a14="http://schemas.microsoft.com/office/drawing/2010/main" w="9525">
                   <a:solidFill>
                     <a:srgbClr val="000000"/>
                   </a:solidFill>
@@ -4303,7 +4303,7 @@
             </a:ln>
             <a:extLst>
               <a:ext uri="{91240B29-F687-4f45-9708-019B960494DF}">
-                <a14:hiddenLine xmlns:a14="http://schemas.microsoft.com/office/drawing/2010/main" xmlns="" w="9525">
+                <a14:hiddenLine xmlns="" xmlns:a14="http://schemas.microsoft.com/office/drawing/2010/main" w="9525">
                   <a:solidFill>
                     <a:srgbClr val="000000"/>
                   </a:solidFill>
@@ -4393,7 +4393,7 @@
             </a:ln>
             <a:extLst>
               <a:ext uri="{91240B29-F687-4f45-9708-019B960494DF}">
-                <a14:hiddenLine xmlns:a14="http://schemas.microsoft.com/office/drawing/2010/main" xmlns="" w="9525">
+                <a14:hiddenLine xmlns="" xmlns:a14="http://schemas.microsoft.com/office/drawing/2010/main" w="9525">
                   <a:solidFill>
                     <a:srgbClr val="000000"/>
                   </a:solidFill>
@@ -4455,7 +4455,7 @@
             </a:ln>
             <a:extLst>
               <a:ext uri="{91240B29-F687-4f45-9708-019B960494DF}">
-                <a14:hiddenLine xmlns:a14="http://schemas.microsoft.com/office/drawing/2010/main" xmlns="" w="9525">
+                <a14:hiddenLine xmlns="" xmlns:a14="http://schemas.microsoft.com/office/drawing/2010/main" w="9525">
                   <a:solidFill>
                     <a:srgbClr val="000000"/>
                   </a:solidFill>
@@ -4545,7 +4545,7 @@
             </a:ln>
             <a:extLst>
               <a:ext uri="{91240B29-F687-4f45-9708-019B960494DF}">
-                <a14:hiddenLine xmlns:a14="http://schemas.microsoft.com/office/drawing/2010/main" xmlns="" w="9525">
+                <a14:hiddenLine xmlns="" xmlns:a14="http://schemas.microsoft.com/office/drawing/2010/main" w="9525">
                   <a:solidFill>
                     <a:srgbClr val="000000"/>
                   </a:solidFill>
@@ -4635,7 +4635,7 @@
             </a:ln>
             <a:extLst>
               <a:ext uri="{91240B29-F687-4f45-9708-019B960494DF}">
-                <a14:hiddenLine xmlns:a14="http://schemas.microsoft.com/office/drawing/2010/main" xmlns="" w="9525">
+                <a14:hiddenLine xmlns="" xmlns:a14="http://schemas.microsoft.com/office/drawing/2010/main" w="9525">
                   <a:solidFill>
                     <a:srgbClr val="000000"/>
                   </a:solidFill>
@@ -4700,7 +4700,7 @@
             </a:ln>
             <a:extLst>
               <a:ext uri="{91240B29-F687-4f45-9708-019B960494DF}">
-                <a14:hiddenLine xmlns:a14="http://schemas.microsoft.com/office/drawing/2010/main" xmlns="" w="9525">
+                <a14:hiddenLine xmlns="" xmlns:a14="http://schemas.microsoft.com/office/drawing/2010/main" w="9525">
                   <a:solidFill>
                     <a:srgbClr val="000000"/>
                   </a:solidFill>
@@ -4762,7 +4762,7 @@
             </a:ln>
             <a:extLst>
               <a:ext uri="{91240B29-F687-4f45-9708-019B960494DF}">
-                <a14:hiddenLine xmlns:a14="http://schemas.microsoft.com/office/drawing/2010/main" xmlns="" w="9525">
+                <a14:hiddenLine xmlns="" xmlns:a14="http://schemas.microsoft.com/office/drawing/2010/main" w="9525">
                   <a:solidFill>
                     <a:srgbClr val="000000"/>
                   </a:solidFill>
@@ -4852,7 +4852,7 @@
             </a:ln>
             <a:extLst>
               <a:ext uri="{91240B29-F687-4f45-9708-019B960494DF}">
-                <a14:hiddenLine xmlns:a14="http://schemas.microsoft.com/office/drawing/2010/main" xmlns="" w="9525">
+                <a14:hiddenLine xmlns="" xmlns:a14="http://schemas.microsoft.com/office/drawing/2010/main" w="9525">
                   <a:solidFill>
                     <a:srgbClr val="000000"/>
                   </a:solidFill>
@@ -4942,7 +4942,7 @@
             </a:ln>
             <a:extLst>
               <a:ext uri="{91240B29-F687-4f45-9708-019B960494DF}">
-                <a14:hiddenLine xmlns:a14="http://schemas.microsoft.com/office/drawing/2010/main" xmlns="" w="9525">
+                <a14:hiddenLine xmlns="" xmlns:a14="http://schemas.microsoft.com/office/drawing/2010/main" w="9525">
                   <a:solidFill>
                     <a:srgbClr val="000000"/>
                   </a:solidFill>
@@ -5004,7 +5004,7 @@
             </a:ln>
             <a:extLst>
               <a:ext uri="{91240B29-F687-4f45-9708-019B960494DF}">
-                <a14:hiddenLine xmlns:a14="http://schemas.microsoft.com/office/drawing/2010/main" xmlns="" w="9525">
+                <a14:hiddenLine xmlns="" xmlns:a14="http://schemas.microsoft.com/office/drawing/2010/main" w="9525">
                   <a:solidFill>
                     <a:srgbClr val="000000"/>
                   </a:solidFill>
@@ -5124,7 +5124,7 @@
             </a:ln>
             <a:extLst>
               <a:ext uri="{91240B29-F687-4f45-9708-019B960494DF}">
-                <a14:hiddenLine xmlns:a14="http://schemas.microsoft.com/office/drawing/2010/main" xmlns="" w="9525">
+                <a14:hiddenLine xmlns="" xmlns:a14="http://schemas.microsoft.com/office/drawing/2010/main" w="9525">
                   <a:solidFill>
                     <a:srgbClr val="000000"/>
                   </a:solidFill>
@@ -5192,7 +5192,7 @@
             </a:ln>
             <a:extLst>
               <a:ext uri="{91240B29-F687-4f45-9708-019B960494DF}">
-                <a14:hiddenLine xmlns:a14="http://schemas.microsoft.com/office/drawing/2010/main" xmlns="" w="9525">
+                <a14:hiddenLine xmlns="" xmlns:a14="http://schemas.microsoft.com/office/drawing/2010/main" w="9525">
                   <a:solidFill>
                     <a:srgbClr val="000000"/>
                   </a:solidFill>
@@ -5282,7 +5282,7 @@
             </a:ln>
             <a:extLst>
               <a:ext uri="{91240B29-F687-4f45-9708-019B960494DF}">
-                <a14:hiddenLine xmlns:a14="http://schemas.microsoft.com/office/drawing/2010/main" xmlns="" w="9525">
+                <a14:hiddenLine xmlns="" xmlns:a14="http://schemas.microsoft.com/office/drawing/2010/main" w="9525">
                   <a:solidFill>
                     <a:srgbClr val="000000"/>
                   </a:solidFill>
@@ -5422,7 +5422,7 @@
           <a:p>
             <a:fld id="{EC4347D3-4C9A-C240-8F14-750059DFEEB0}" type="datetimeFigureOut">
               <a:rPr lang="en-US" smtClean="0"/>
-              <a:t>8/25/25</a:t>
+              <a:t>9/2/25</a:t>
             </a:fld>
             <a:endParaRPr lang="en-US"/>
           </a:p>
@@ -5689,7 +5689,7 @@
           <a:p>
             <a:fld id="{EC4347D3-4C9A-C240-8F14-750059DFEEB0}" type="datetimeFigureOut">
               <a:rPr lang="en-US" smtClean="0"/>
-              <a:t>8/25/25</a:t>
+              <a:t>9/2/25</a:t>
             </a:fld>
             <a:endParaRPr lang="en-US"/>
           </a:p>
@@ -5885,7 +5885,7 @@
           <a:p>
             <a:fld id="{EC4347D3-4C9A-C240-8F14-750059DFEEB0}" type="datetimeFigureOut">
               <a:rPr lang="en-US" smtClean="0"/>
-              <a:t>8/25/25</a:t>
+              <a:t>9/2/25</a:t>
             </a:fld>
             <a:endParaRPr lang="en-US"/>
           </a:p>
@@ -6148,7 +6148,7 @@
           <a:p>
             <a:fld id="{EC4347D3-4C9A-C240-8F14-750059DFEEB0}" type="datetimeFigureOut">
               <a:rPr lang="en-US" smtClean="0"/>
-              <a:t>8/25/25</a:t>
+              <a:t>9/2/25</a:t>
             </a:fld>
             <a:endParaRPr lang="en-US"/>
           </a:p>
@@ -6582,7 +6582,7 @@
           <a:p>
             <a:fld id="{EC4347D3-4C9A-C240-8F14-750059DFEEB0}" type="datetimeFigureOut">
               <a:rPr lang="en-US" smtClean="0"/>
-              <a:t>8/25/25</a:t>
+              <a:t>9/2/25</a:t>
             </a:fld>
             <a:endParaRPr lang="en-US"/>
           </a:p>
@@ -7128,7 +7128,7 @@
           <a:p>
             <a:fld id="{EC4347D3-4C9A-C240-8F14-750059DFEEB0}" type="datetimeFigureOut">
               <a:rPr lang="en-US" smtClean="0"/>
-              <a:t>8/25/25</a:t>
+              <a:t>9/2/25</a:t>
             </a:fld>
             <a:endParaRPr lang="en-US"/>
           </a:p>
@@ -7848,7 +7848,7 @@
           <a:p>
             <a:fld id="{EC4347D3-4C9A-C240-8F14-750059DFEEB0}" type="datetimeFigureOut">
               <a:rPr lang="en-US" smtClean="0"/>
-              <a:t>8/25/25</a:t>
+              <a:t>9/2/25</a:t>
             </a:fld>
             <a:endParaRPr lang="en-US"/>
           </a:p>
@@ -8018,7 +8018,7 @@
           <a:p>
             <a:fld id="{EC4347D3-4C9A-C240-8F14-750059DFEEB0}" type="datetimeFigureOut">
               <a:rPr lang="en-US" smtClean="0"/>
-              <a:t>8/25/25</a:t>
+              <a:t>9/2/25</a:t>
             </a:fld>
             <a:endParaRPr lang="en-US"/>
           </a:p>
@@ -8198,7 +8198,7 @@
           <a:p>
             <a:fld id="{EC4347D3-4C9A-C240-8F14-750059DFEEB0}" type="datetimeFigureOut">
               <a:rPr lang="en-US" smtClean="0"/>
-              <a:t>8/25/25</a:t>
+              <a:t>9/2/25</a:t>
             </a:fld>
             <a:endParaRPr lang="en-US"/>
           </a:p>
@@ -8368,7 +8368,7 @@
           <a:p>
             <a:fld id="{EC4347D3-4C9A-C240-8F14-750059DFEEB0}" type="datetimeFigureOut">
               <a:rPr lang="en-US" smtClean="0"/>
-              <a:t>8/25/25</a:t>
+              <a:t>9/2/25</a:t>
             </a:fld>
             <a:endParaRPr lang="en-US"/>
           </a:p>
@@ -8618,7 +8618,7 @@
           <a:p>
             <a:fld id="{EC4347D3-4C9A-C240-8F14-750059DFEEB0}" type="datetimeFigureOut">
               <a:rPr lang="en-US" smtClean="0"/>
-              <a:t>8/25/25</a:t>
+              <a:t>9/2/25</a:t>
             </a:fld>
             <a:endParaRPr lang="en-US"/>
           </a:p>
@@ -8850,7 +8850,7 @@
           <a:p>
             <a:fld id="{EC4347D3-4C9A-C240-8F14-750059DFEEB0}" type="datetimeFigureOut">
               <a:rPr lang="en-US" smtClean="0"/>
-              <a:t>8/25/25</a:t>
+              <a:t>9/2/25</a:t>
             </a:fld>
             <a:endParaRPr lang="en-US"/>
           </a:p>
@@ -9236,7 +9236,7 @@
           <a:p>
             <a:fld id="{EC4347D3-4C9A-C240-8F14-750059DFEEB0}" type="datetimeFigureOut">
               <a:rPr lang="en-US" smtClean="0"/>
-              <a:t>8/25/25</a:t>
+              <a:t>9/2/25</a:t>
             </a:fld>
             <a:endParaRPr lang="en-US"/>
           </a:p>
@@ -9359,7 +9359,7 @@
           <a:p>
             <a:fld id="{EC4347D3-4C9A-C240-8F14-750059DFEEB0}" type="datetimeFigureOut">
               <a:rPr lang="en-US" smtClean="0"/>
-              <a:t>8/25/25</a:t>
+              <a:t>9/2/25</a:t>
             </a:fld>
             <a:endParaRPr lang="en-US"/>
           </a:p>
@@ -9454,7 +9454,7 @@
           <a:p>
             <a:fld id="{EC4347D3-4C9A-C240-8F14-750059DFEEB0}" type="datetimeFigureOut">
               <a:rPr lang="en-US" smtClean="0"/>
-              <a:t>8/25/25</a:t>
+              <a:t>9/2/25</a:t>
             </a:fld>
             <a:endParaRPr lang="en-US"/>
           </a:p>
@@ -9703,7 +9703,7 @@
           <a:p>
             <a:fld id="{EC4347D3-4C9A-C240-8F14-750059DFEEB0}" type="datetimeFigureOut">
               <a:rPr lang="en-US" smtClean="0"/>
-              <a:t>8/25/25</a:t>
+              <a:t>9/2/25</a:t>
             </a:fld>
             <a:endParaRPr lang="en-US"/>
           </a:p>
@@ -9988,7 +9988,7 @@
           <a:p>
             <a:fld id="{EC4347D3-4C9A-C240-8F14-750059DFEEB0}" type="datetimeFigureOut">
               <a:rPr lang="en-US" smtClean="0"/>
-              <a:t>8/25/25</a:t>
+              <a:t>9/2/25</a:t>
             </a:fld>
             <a:endParaRPr lang="en-US"/>
           </a:p>
@@ -10111,7 +10111,7 @@
           <a:noFill/>
           <a:extLst>
             <a:ext uri="{909E8E84-426E-40dd-AFC4-6F175D3DCCD1}">
-              <a14:hiddenFill xmlns:a14="http://schemas.microsoft.com/office/drawing/2010/main" xmlns="">
+              <a14:hiddenFill xmlns="" xmlns:a14="http://schemas.microsoft.com/office/drawing/2010/main">
                 <a:solidFill>
                   <a:srgbClr val="FFFFFF"/>
                 </a:solidFill>
@@ -10185,7 +10185,7 @@
               </a:ln>
               <a:extLst>
                 <a:ext uri="{91240B29-F687-4f45-9708-019B960494DF}">
-                  <a14:hiddenLine xmlns:a14="http://schemas.microsoft.com/office/drawing/2010/main" xmlns="" w="9525">
+                  <a14:hiddenLine xmlns="" xmlns:a14="http://schemas.microsoft.com/office/drawing/2010/main" w="9525">
                     <a:solidFill>
                       <a:srgbClr val="000000"/>
                     </a:solidFill>
@@ -10275,7 +10275,7 @@
               </a:ln>
               <a:extLst>
                 <a:ext uri="{91240B29-F687-4f45-9708-019B960494DF}">
-                  <a14:hiddenLine xmlns:a14="http://schemas.microsoft.com/office/drawing/2010/main" xmlns="" w="9525">
+                  <a14:hiddenLine xmlns="" xmlns:a14="http://schemas.microsoft.com/office/drawing/2010/main" w="9525">
                     <a:solidFill>
                       <a:srgbClr val="000000"/>
                     </a:solidFill>
@@ -10365,7 +10365,7 @@
               </a:ln>
               <a:extLst>
                 <a:ext uri="{91240B29-F687-4f45-9708-019B960494DF}">
-                  <a14:hiddenLine xmlns:a14="http://schemas.microsoft.com/office/drawing/2010/main" xmlns="" w="9525">
+                  <a14:hiddenLine xmlns="" xmlns:a14="http://schemas.microsoft.com/office/drawing/2010/main" w="9525">
                     <a:solidFill>
                       <a:srgbClr val="000000"/>
                     </a:solidFill>
@@ -10427,7 +10427,7 @@
               </a:ln>
               <a:extLst>
                 <a:ext uri="{91240B29-F687-4f45-9708-019B960494DF}">
-                  <a14:hiddenLine xmlns:a14="http://schemas.microsoft.com/office/drawing/2010/main" xmlns="" w="9525">
+                  <a14:hiddenLine xmlns="" xmlns:a14="http://schemas.microsoft.com/office/drawing/2010/main" w="9525">
                     <a:solidFill>
                       <a:srgbClr val="000000"/>
                     </a:solidFill>
@@ -10517,7 +10517,7 @@
               </a:ln>
               <a:extLst>
                 <a:ext uri="{91240B29-F687-4f45-9708-019B960494DF}">
-                  <a14:hiddenLine xmlns:a14="http://schemas.microsoft.com/office/drawing/2010/main" xmlns="" w="9525">
+                  <a14:hiddenLine xmlns="" xmlns:a14="http://schemas.microsoft.com/office/drawing/2010/main" w="9525">
                     <a:solidFill>
                       <a:srgbClr val="000000"/>
                     </a:solidFill>
@@ -10579,7 +10579,7 @@
               </a:ln>
               <a:extLst>
                 <a:ext uri="{91240B29-F687-4f45-9708-019B960494DF}">
-                  <a14:hiddenLine xmlns:a14="http://schemas.microsoft.com/office/drawing/2010/main" xmlns="" w="9525">
+                  <a14:hiddenLine xmlns="" xmlns:a14="http://schemas.microsoft.com/office/drawing/2010/main" w="9525">
                     <a:solidFill>
                       <a:srgbClr val="000000"/>
                     </a:solidFill>
@@ -10641,7 +10641,7 @@
               </a:ln>
               <a:extLst>
                 <a:ext uri="{91240B29-F687-4f45-9708-019B960494DF}">
-                  <a14:hiddenLine xmlns:a14="http://schemas.microsoft.com/office/drawing/2010/main" xmlns="" w="9525">
+                  <a14:hiddenLine xmlns="" xmlns:a14="http://schemas.microsoft.com/office/drawing/2010/main" w="9525">
                     <a:solidFill>
                       <a:srgbClr val="000000"/>
                     </a:solidFill>
@@ -10731,7 +10731,7 @@
               </a:ln>
               <a:extLst>
                 <a:ext uri="{91240B29-F687-4f45-9708-019B960494DF}">
-                  <a14:hiddenLine xmlns:a14="http://schemas.microsoft.com/office/drawing/2010/main" xmlns="" w="9525">
+                  <a14:hiddenLine xmlns="" xmlns:a14="http://schemas.microsoft.com/office/drawing/2010/main" w="9525">
                     <a:solidFill>
                       <a:srgbClr val="000000"/>
                     </a:solidFill>
@@ -10821,7 +10821,7 @@
               </a:ln>
               <a:extLst>
                 <a:ext uri="{91240B29-F687-4f45-9708-019B960494DF}">
-                  <a14:hiddenLine xmlns:a14="http://schemas.microsoft.com/office/drawing/2010/main" xmlns="" w="9525">
+                  <a14:hiddenLine xmlns="" xmlns:a14="http://schemas.microsoft.com/office/drawing/2010/main" w="9525">
                     <a:solidFill>
                       <a:srgbClr val="000000"/>
                     </a:solidFill>
@@ -10883,7 +10883,7 @@
               </a:ln>
               <a:extLst>
                 <a:ext uri="{91240B29-F687-4f45-9708-019B960494DF}">
-                  <a14:hiddenLine xmlns:a14="http://schemas.microsoft.com/office/drawing/2010/main" xmlns="" w="9525">
+                  <a14:hiddenLine xmlns="" xmlns:a14="http://schemas.microsoft.com/office/drawing/2010/main" w="9525">
                     <a:solidFill>
                       <a:srgbClr val="000000"/>
                     </a:solidFill>
@@ -10993,7 +10993,7 @@
               </a:ln>
               <a:extLst>
                 <a:ext uri="{91240B29-F687-4f45-9708-019B960494DF}">
-                  <a14:hiddenLine xmlns:a14="http://schemas.microsoft.com/office/drawing/2010/main" xmlns="" w="9525">
+                  <a14:hiddenLine xmlns="" xmlns:a14="http://schemas.microsoft.com/office/drawing/2010/main" w="9525">
                     <a:solidFill>
                       <a:srgbClr val="000000"/>
                     </a:solidFill>
@@ -11077,7 +11077,7 @@
               </a:ln>
               <a:extLst>
                 <a:ext uri="{91240B29-F687-4f45-9708-019B960494DF}">
-                  <a14:hiddenLine xmlns:a14="http://schemas.microsoft.com/office/drawing/2010/main" xmlns="" w="9525">
+                  <a14:hiddenLine xmlns="" xmlns:a14="http://schemas.microsoft.com/office/drawing/2010/main" w="9525">
                     <a:solidFill>
                       <a:srgbClr val="000000"/>
                     </a:solidFill>
@@ -11139,7 +11139,7 @@
               </a:ln>
               <a:extLst>
                 <a:ext uri="{91240B29-F687-4f45-9708-019B960494DF}">
-                  <a14:hiddenLine xmlns:a14="http://schemas.microsoft.com/office/drawing/2010/main" xmlns="" w="9525">
+                  <a14:hiddenLine xmlns="" xmlns:a14="http://schemas.microsoft.com/office/drawing/2010/main" w="9525">
                     <a:solidFill>
                       <a:srgbClr val="000000"/>
                     </a:solidFill>
@@ -11201,7 +11201,7 @@
               </a:ln>
               <a:extLst>
                 <a:ext uri="{91240B29-F687-4f45-9708-019B960494DF}">
-                  <a14:hiddenLine xmlns:a14="http://schemas.microsoft.com/office/drawing/2010/main" xmlns="" w="9525">
+                  <a14:hiddenLine xmlns="" xmlns:a14="http://schemas.microsoft.com/office/drawing/2010/main" w="9525">
                     <a:solidFill>
                       <a:srgbClr val="000000"/>
                     </a:solidFill>
@@ -11291,7 +11291,7 @@
               </a:ln>
               <a:extLst>
                 <a:ext uri="{91240B29-F687-4f45-9708-019B960494DF}">
-                  <a14:hiddenLine xmlns:a14="http://schemas.microsoft.com/office/drawing/2010/main" xmlns="" w="9525">
+                  <a14:hiddenLine xmlns="" xmlns:a14="http://schemas.microsoft.com/office/drawing/2010/main" w="9525">
                     <a:solidFill>
                       <a:srgbClr val="000000"/>
                     </a:solidFill>
@@ -11325,7 +11325,7 @@
               </a:ln>
               <a:extLst>
                 <a:ext uri="{91240B29-F687-4f45-9708-019B960494DF}">
-                  <a14:hiddenLine xmlns:a14="http://schemas.microsoft.com/office/drawing/2010/main" xmlns="" w="9525">
+                  <a14:hiddenLine xmlns="" xmlns:a14="http://schemas.microsoft.com/office/drawing/2010/main" w="9525">
                     <a:solidFill>
                       <a:srgbClr val="000000"/>
                     </a:solidFill>
@@ -11390,7 +11390,7 @@
               </a:ln>
               <a:extLst>
                 <a:ext uri="{91240B29-F687-4f45-9708-019B960494DF}">
-                  <a14:hiddenLine xmlns:a14="http://schemas.microsoft.com/office/drawing/2010/main" xmlns="" w="9525">
+                  <a14:hiddenLine xmlns="" xmlns:a14="http://schemas.microsoft.com/office/drawing/2010/main" w="9525">
                     <a:solidFill>
                       <a:srgbClr val="000000"/>
                     </a:solidFill>
@@ -11480,7 +11480,7 @@
               </a:ln>
               <a:extLst>
                 <a:ext uri="{91240B29-F687-4f45-9708-019B960494DF}">
-                  <a14:hiddenLine xmlns:a14="http://schemas.microsoft.com/office/drawing/2010/main" xmlns="" w="9525">
+                  <a14:hiddenLine xmlns="" xmlns:a14="http://schemas.microsoft.com/office/drawing/2010/main" w="9525">
                     <a:solidFill>
                       <a:srgbClr val="000000"/>
                     </a:solidFill>
@@ -11542,7 +11542,7 @@
               </a:ln>
               <a:extLst>
                 <a:ext uri="{91240B29-F687-4f45-9708-019B960494DF}">
-                  <a14:hiddenLine xmlns:a14="http://schemas.microsoft.com/office/drawing/2010/main" xmlns="" w="9525">
+                  <a14:hiddenLine xmlns="" xmlns:a14="http://schemas.microsoft.com/office/drawing/2010/main" w="9525">
                     <a:solidFill>
                       <a:srgbClr val="000000"/>
                     </a:solidFill>
@@ -11632,7 +11632,7 @@
               </a:ln>
               <a:extLst>
                 <a:ext uri="{91240B29-F687-4f45-9708-019B960494DF}">
-                  <a14:hiddenLine xmlns:a14="http://schemas.microsoft.com/office/drawing/2010/main" xmlns="" w="9525">
+                  <a14:hiddenLine xmlns="" xmlns:a14="http://schemas.microsoft.com/office/drawing/2010/main" w="9525">
                     <a:solidFill>
                       <a:srgbClr val="000000"/>
                     </a:solidFill>
@@ -11697,7 +11697,7 @@
               </a:ln>
               <a:extLst>
                 <a:ext uri="{91240B29-F687-4f45-9708-019B960494DF}">
-                  <a14:hiddenLine xmlns:a14="http://schemas.microsoft.com/office/drawing/2010/main" xmlns="" w="9525">
+                  <a14:hiddenLine xmlns="" xmlns:a14="http://schemas.microsoft.com/office/drawing/2010/main" w="9525">
                     <a:solidFill>
                       <a:srgbClr val="000000"/>
                     </a:solidFill>
@@ -11759,7 +11759,7 @@
               </a:ln>
               <a:extLst>
                 <a:ext uri="{91240B29-F687-4f45-9708-019B960494DF}">
-                  <a14:hiddenLine xmlns:a14="http://schemas.microsoft.com/office/drawing/2010/main" xmlns="" w="9525">
+                  <a14:hiddenLine xmlns="" xmlns:a14="http://schemas.microsoft.com/office/drawing/2010/main" w="9525">
                     <a:solidFill>
                       <a:srgbClr val="000000"/>
                     </a:solidFill>
@@ -11849,7 +11849,7 @@
               </a:ln>
               <a:extLst>
                 <a:ext uri="{91240B29-F687-4f45-9708-019B960494DF}">
-                  <a14:hiddenLine xmlns:a14="http://schemas.microsoft.com/office/drawing/2010/main" xmlns="" w="9525">
+                  <a14:hiddenLine xmlns="" xmlns:a14="http://schemas.microsoft.com/office/drawing/2010/main" w="9525">
                     <a:solidFill>
                       <a:srgbClr val="000000"/>
                     </a:solidFill>
@@ -11939,7 +11939,7 @@
               </a:ln>
               <a:extLst>
                 <a:ext uri="{91240B29-F687-4f45-9708-019B960494DF}">
-                  <a14:hiddenLine xmlns:a14="http://schemas.microsoft.com/office/drawing/2010/main" xmlns="" w="9525">
+                  <a14:hiddenLine xmlns="" xmlns:a14="http://schemas.microsoft.com/office/drawing/2010/main" w="9525">
                     <a:solidFill>
                       <a:srgbClr val="000000"/>
                     </a:solidFill>
@@ -12004,7 +12004,7 @@
               </a:ln>
               <a:extLst>
                 <a:ext uri="{91240B29-F687-4f45-9708-019B960494DF}">
-                  <a14:hiddenLine xmlns:a14="http://schemas.microsoft.com/office/drawing/2010/main" xmlns="" w="9525">
+                  <a14:hiddenLine xmlns="" xmlns:a14="http://schemas.microsoft.com/office/drawing/2010/main" w="9525">
                     <a:solidFill>
                       <a:srgbClr val="000000"/>
                     </a:solidFill>
@@ -12124,7 +12124,7 @@
               </a:ln>
               <a:extLst>
                 <a:ext uri="{91240B29-F687-4f45-9708-019B960494DF}">
-                  <a14:hiddenLine xmlns:a14="http://schemas.microsoft.com/office/drawing/2010/main" xmlns="" w="9525">
+                  <a14:hiddenLine xmlns="" xmlns:a14="http://schemas.microsoft.com/office/drawing/2010/main" w="9525">
                     <a:solidFill>
                       <a:srgbClr val="000000"/>
                     </a:solidFill>
@@ -12205,7 +12205,7 @@
               </a:ln>
               <a:extLst>
                 <a:ext uri="{91240B29-F687-4f45-9708-019B960494DF}">
-                  <a14:hiddenLine xmlns:a14="http://schemas.microsoft.com/office/drawing/2010/main" xmlns="" w="9525">
+                  <a14:hiddenLine xmlns="" xmlns:a14="http://schemas.microsoft.com/office/drawing/2010/main" w="9525">
                     <a:solidFill>
                       <a:srgbClr val="000000"/>
                     </a:solidFill>
@@ -12320,7 +12320,7 @@
               </a:ln>
               <a:extLst>
                 <a:ext uri="{91240B29-F687-4f45-9708-019B960494DF}">
-                  <a14:hiddenLine xmlns:a14="http://schemas.microsoft.com/office/drawing/2010/main" xmlns="" w="9525">
+                  <a14:hiddenLine xmlns="" xmlns:a14="http://schemas.microsoft.com/office/drawing/2010/main" w="9525">
                     <a:solidFill>
                       <a:srgbClr val="000000"/>
                     </a:solidFill>
@@ -12410,7 +12410,7 @@
               </a:ln>
               <a:extLst>
                 <a:ext uri="{91240B29-F687-4f45-9708-019B960494DF}">
-                  <a14:hiddenLine xmlns:a14="http://schemas.microsoft.com/office/drawing/2010/main" xmlns="" w="9525">
+                  <a14:hiddenLine xmlns="" xmlns:a14="http://schemas.microsoft.com/office/drawing/2010/main" w="9525">
                     <a:solidFill>
                       <a:srgbClr val="000000"/>
                     </a:solidFill>
@@ -12475,7 +12475,7 @@
               </a:ln>
               <a:extLst>
                 <a:ext uri="{91240B29-F687-4f45-9708-019B960494DF}">
-                  <a14:hiddenLine xmlns:a14="http://schemas.microsoft.com/office/drawing/2010/main" xmlns="" w="9525">
+                  <a14:hiddenLine xmlns="" xmlns:a14="http://schemas.microsoft.com/office/drawing/2010/main" w="9525">
                     <a:solidFill>
                       <a:srgbClr val="000000"/>
                     </a:solidFill>
@@ -12565,7 +12565,7 @@
               </a:ln>
               <a:extLst>
                 <a:ext uri="{91240B29-F687-4f45-9708-019B960494DF}">
-                  <a14:hiddenLine xmlns:a14="http://schemas.microsoft.com/office/drawing/2010/main" xmlns="" w="9525">
+                  <a14:hiddenLine xmlns="" xmlns:a14="http://schemas.microsoft.com/office/drawing/2010/main" w="9525">
                     <a:solidFill>
                       <a:srgbClr val="000000"/>
                     </a:solidFill>
@@ -12633,7 +12633,7 @@
               </a:ln>
               <a:extLst>
                 <a:ext uri="{91240B29-F687-4f45-9708-019B960494DF}">
-                  <a14:hiddenLine xmlns:a14="http://schemas.microsoft.com/office/drawing/2010/main" xmlns="" w="9525">
+                  <a14:hiddenLine xmlns="" xmlns:a14="http://schemas.microsoft.com/office/drawing/2010/main" w="9525">
                     <a:solidFill>
                       <a:srgbClr val="000000"/>
                     </a:solidFill>
@@ -12723,7 +12723,7 @@
               </a:ln>
               <a:extLst>
                 <a:ext uri="{91240B29-F687-4f45-9708-019B960494DF}">
-                  <a14:hiddenLine xmlns:a14="http://schemas.microsoft.com/office/drawing/2010/main" xmlns="" w="9525">
+                  <a14:hiddenLine xmlns="" xmlns:a14="http://schemas.microsoft.com/office/drawing/2010/main" w="9525">
                     <a:solidFill>
                       <a:srgbClr val="000000"/>
                     </a:solidFill>
@@ -12791,7 +12791,7 @@
               </a:ln>
               <a:extLst>
                 <a:ext uri="{91240B29-F687-4f45-9708-019B960494DF}">
-                  <a14:hiddenLine xmlns:a14="http://schemas.microsoft.com/office/drawing/2010/main" xmlns="" w="9525">
+                  <a14:hiddenLine xmlns="" xmlns:a14="http://schemas.microsoft.com/office/drawing/2010/main" w="9525">
                     <a:solidFill>
                       <a:srgbClr val="000000"/>
                     </a:solidFill>
@@ -12881,7 +12881,7 @@
               </a:ln>
               <a:extLst>
                 <a:ext uri="{91240B29-F687-4f45-9708-019B960494DF}">
-                  <a14:hiddenLine xmlns:a14="http://schemas.microsoft.com/office/drawing/2010/main" xmlns="" w="9525">
+                  <a14:hiddenLine xmlns="" xmlns:a14="http://schemas.microsoft.com/office/drawing/2010/main" w="9525">
                     <a:solidFill>
                       <a:srgbClr val="000000"/>
                     </a:solidFill>
@@ -12915,7 +12915,7 @@
               </a:ln>
               <a:extLst>
                 <a:ext uri="{91240B29-F687-4f45-9708-019B960494DF}">
-                  <a14:hiddenLine xmlns:a14="http://schemas.microsoft.com/office/drawing/2010/main" xmlns="" w="9525">
+                  <a14:hiddenLine xmlns="" xmlns:a14="http://schemas.microsoft.com/office/drawing/2010/main" w="9525">
                     <a:solidFill>
                       <a:srgbClr val="000000"/>
                     </a:solidFill>
@@ -13055,7 +13055,7 @@
           <a:p>
             <a:fld id="{EC4347D3-4C9A-C240-8F14-750059DFEEB0}" type="datetimeFigureOut">
               <a:rPr lang="en-US" smtClean="0"/>
-              <a:t>8/25/25</a:t>
+              <a:t>9/2/25</a:t>
             </a:fld>
             <a:endParaRPr lang="en-US"/>
           </a:p>

</xml_diff>